<commit_message>
Updates for LINQ Internals II
</commit_message>
<xml_diff>
--- a/LINQ2/KDahlby.201008.STLDODN.LINQ2.pptx
+++ b/LINQ2/KDahlby.201008.STLDODN.LINQ2.pptx
@@ -9785,7 +9785,7 @@
               <a:pPr>
                 <a:defRPr/>
               </a:pPr>
-              <a:t>8/20/2010</a:t>
+              <a:t>8/21/2010</a:t>
             </a:fld>
             <a:endParaRPr lang="en-US" dirty="0"/>
           </a:p>
@@ -10699,7 +10699,7 @@
             <a:fld id="{81331B57-0BE5-4F82-AA58-76F53EFF3ADA}" type="datetime8">
               <a:rPr lang="en-US" smtClean="0"/>
               <a:pPr/>
-              <a:t>8/20/2010 11:27 PM</a:t>
+              <a:t>8/21/2010 3:13 PM</a:t>
             </a:fld>
             <a:endParaRPr lang="en-US" dirty="0"/>
           </a:p>
@@ -10980,7 +10980,7 @@
               <a:pPr>
                 <a:defRPr/>
               </a:pPr>
-              <a:t>8/20/2010</a:t>
+              <a:t>8/21/2010</a:t>
             </a:fld>
             <a:endParaRPr lang="en-US"/>
           </a:p>
@@ -11175,7 +11175,7 @@
               <a:pPr>
                 <a:defRPr/>
               </a:pPr>
-              <a:t>8/20/2010</a:t>
+              <a:t>8/21/2010</a:t>
             </a:fld>
             <a:endParaRPr lang="en-US" dirty="0"/>
           </a:p>
@@ -11380,7 +11380,7 @@
               <a:pPr>
                 <a:defRPr/>
               </a:pPr>
-              <a:t>8/20/2010</a:t>
+              <a:t>8/21/2010</a:t>
             </a:fld>
             <a:endParaRPr lang="en-US" dirty="0"/>
           </a:p>
@@ -11615,7 +11615,7 @@
               <a:pPr>
                 <a:defRPr/>
               </a:pPr>
-              <a:t>8/20/2010</a:t>
+              <a:t>8/21/2010</a:t>
             </a:fld>
             <a:endParaRPr lang="en-US" dirty="0"/>
           </a:p>
@@ -11887,7 +11887,7 @@
               <a:pPr>
                 <a:defRPr/>
               </a:pPr>
-              <a:t>8/20/2010</a:t>
+              <a:t>8/21/2010</a:t>
             </a:fld>
             <a:endParaRPr lang="en-US"/>
           </a:p>
@@ -12181,7 +12181,7 @@
               <a:pPr>
                 <a:defRPr/>
               </a:pPr>
-              <a:t>8/20/2010</a:t>
+              <a:t>8/21/2010</a:t>
             </a:fld>
             <a:endParaRPr lang="en-US" dirty="0"/>
           </a:p>
@@ -12589,7 +12589,7 @@
               <a:pPr>
                 <a:defRPr/>
               </a:pPr>
-              <a:t>8/20/2010</a:t>
+              <a:t>8/21/2010</a:t>
             </a:fld>
             <a:endParaRPr lang="en-US" dirty="0"/>
           </a:p>
@@ -12769,7 +12769,7 @@
               <a:pPr>
                 <a:defRPr/>
               </a:pPr>
-              <a:t>8/20/2010</a:t>
+              <a:t>8/21/2010</a:t>
             </a:fld>
             <a:endParaRPr lang="en-US" dirty="0"/>
           </a:p>
@@ -12889,7 +12889,7 @@
               <a:pPr>
                 <a:defRPr/>
               </a:pPr>
-              <a:t>8/20/2010</a:t>
+              <a:t>8/21/2010</a:t>
             </a:fld>
             <a:endParaRPr lang="en-US" dirty="0"/>
           </a:p>
@@ -13180,7 +13180,7 @@
               <a:pPr>
                 <a:defRPr/>
               </a:pPr>
-              <a:t>8/20/2010</a:t>
+              <a:t>8/21/2010</a:t>
             </a:fld>
             <a:endParaRPr lang="en-US" dirty="0"/>
           </a:p>
@@ -13825,7 +13825,7 @@
               <a:pPr>
                 <a:defRPr/>
               </a:pPr>
-              <a:t>8/20/2010</a:t>
+              <a:t>8/21/2010</a:t>
             </a:fld>
             <a:endParaRPr lang="en-US"/>
           </a:p>
@@ -14350,7 +14350,7 @@
               <a:pPr>
                 <a:defRPr/>
               </a:pPr>
-              <a:t>8/20/2010</a:t>
+              <a:t>8/21/2010</a:t>
             </a:fld>
             <a:endParaRPr lang="en-US" dirty="0"/>
           </a:p>
@@ -15833,13 +15833,7 @@
               <a:rPr lang="en-US" sz="2000" dirty="0" smtClean="0">
                 <a:latin typeface="Consolas" pitchFamily="49" charset="0"/>
               </a:rPr>
-              <a:t>(count</a:t>
-            </a:r>
-            <a:r>
-              <a:rPr lang="en-US" sz="2000" dirty="0" smtClean="0">
-                <a:latin typeface="Consolas" pitchFamily="49" charset="0"/>
-              </a:rPr>
-              <a:t>)</a:t>
+              <a:t>(count)</a:t>
             </a:r>
           </a:p>
           <a:p>
@@ -15909,7 +15903,453 @@
   <p:timing>
     <p:tnLst>
       <p:par>
-        <p:cTn id="1" dur="indefinite" restart="never" nodeType="tmRoot"/>
+        <p:cTn id="1" dur="indefinite" restart="never" nodeType="tmRoot">
+          <p:childTnLst>
+            <p:seq concurrent="1" nextAc="seek">
+              <p:cTn id="2" dur="indefinite" nodeType="mainSeq">
+                <p:childTnLst>
+                  <p:par>
+                    <p:cTn id="3" fill="hold">
+                      <p:stCondLst>
+                        <p:cond delay="indefinite"/>
+                      </p:stCondLst>
+                      <p:childTnLst>
+                        <p:par>
+                          <p:cTn id="4" fill="hold">
+                            <p:stCondLst>
+                              <p:cond delay="0"/>
+                            </p:stCondLst>
+                            <p:childTnLst>
+                              <p:par>
+                                <p:cTn id="5" presetID="10" presetClass="entr" presetSubtype="0" fill="hold" nodeType="clickEffect">
+                                  <p:stCondLst>
+                                    <p:cond delay="0"/>
+                                  </p:stCondLst>
+                                  <p:childTnLst>
+                                    <p:set>
+                                      <p:cBhvr>
+                                        <p:cTn id="6" dur="1" fill="hold">
+                                          <p:stCondLst>
+                                            <p:cond delay="0"/>
+                                          </p:stCondLst>
+                                        </p:cTn>
+                                        <p:tgtEl>
+                                          <p:spTgt spid="3">
+                                            <p:txEl>
+                                              <p:pRg st="1" end="1"/>
+                                            </p:txEl>
+                                          </p:spTgt>
+                                        </p:tgtEl>
+                                        <p:attrNameLst>
+                                          <p:attrName>style.visibility</p:attrName>
+                                        </p:attrNameLst>
+                                      </p:cBhvr>
+                                      <p:to>
+                                        <p:strVal val="visible"/>
+                                      </p:to>
+                                    </p:set>
+                                    <p:animEffect transition="in" filter="fade">
+                                      <p:cBhvr>
+                                        <p:cTn id="7" dur="2000"/>
+                                        <p:tgtEl>
+                                          <p:spTgt spid="3">
+                                            <p:txEl>
+                                              <p:pRg st="1" end="1"/>
+                                            </p:txEl>
+                                          </p:spTgt>
+                                        </p:tgtEl>
+                                      </p:cBhvr>
+                                    </p:animEffect>
+                                  </p:childTnLst>
+                                </p:cTn>
+                              </p:par>
+                              <p:par>
+                                <p:cTn id="8" presetID="10" presetClass="entr" presetSubtype="0" fill="hold" nodeType="withEffect">
+                                  <p:stCondLst>
+                                    <p:cond delay="0"/>
+                                  </p:stCondLst>
+                                  <p:childTnLst>
+                                    <p:set>
+                                      <p:cBhvr>
+                                        <p:cTn id="9" dur="1" fill="hold">
+                                          <p:stCondLst>
+                                            <p:cond delay="0"/>
+                                          </p:stCondLst>
+                                        </p:cTn>
+                                        <p:tgtEl>
+                                          <p:spTgt spid="3">
+                                            <p:txEl>
+                                              <p:pRg st="2" end="2"/>
+                                            </p:txEl>
+                                          </p:spTgt>
+                                        </p:tgtEl>
+                                        <p:attrNameLst>
+                                          <p:attrName>style.visibility</p:attrName>
+                                        </p:attrNameLst>
+                                      </p:cBhvr>
+                                      <p:to>
+                                        <p:strVal val="visible"/>
+                                      </p:to>
+                                    </p:set>
+                                    <p:animEffect transition="in" filter="fade">
+                                      <p:cBhvr>
+                                        <p:cTn id="10" dur="2000"/>
+                                        <p:tgtEl>
+                                          <p:spTgt spid="3">
+                                            <p:txEl>
+                                              <p:pRg st="2" end="2"/>
+                                            </p:txEl>
+                                          </p:spTgt>
+                                        </p:tgtEl>
+                                      </p:cBhvr>
+                                    </p:animEffect>
+                                  </p:childTnLst>
+                                </p:cTn>
+                              </p:par>
+                              <p:par>
+                                <p:cTn id="11" presetID="10" presetClass="entr" presetSubtype="0" fill="hold" nodeType="withEffect">
+                                  <p:stCondLst>
+                                    <p:cond delay="0"/>
+                                  </p:stCondLst>
+                                  <p:childTnLst>
+                                    <p:set>
+                                      <p:cBhvr>
+                                        <p:cTn id="12" dur="1" fill="hold">
+                                          <p:stCondLst>
+                                            <p:cond delay="0"/>
+                                          </p:stCondLst>
+                                        </p:cTn>
+                                        <p:tgtEl>
+                                          <p:spTgt spid="3">
+                                            <p:txEl>
+                                              <p:pRg st="3" end="3"/>
+                                            </p:txEl>
+                                          </p:spTgt>
+                                        </p:tgtEl>
+                                        <p:attrNameLst>
+                                          <p:attrName>style.visibility</p:attrName>
+                                        </p:attrNameLst>
+                                      </p:cBhvr>
+                                      <p:to>
+                                        <p:strVal val="visible"/>
+                                      </p:to>
+                                    </p:set>
+                                    <p:animEffect transition="in" filter="fade">
+                                      <p:cBhvr>
+                                        <p:cTn id="13" dur="2000"/>
+                                        <p:tgtEl>
+                                          <p:spTgt spid="3">
+                                            <p:txEl>
+                                              <p:pRg st="3" end="3"/>
+                                            </p:txEl>
+                                          </p:spTgt>
+                                        </p:tgtEl>
+                                      </p:cBhvr>
+                                    </p:animEffect>
+                                  </p:childTnLst>
+                                </p:cTn>
+                              </p:par>
+                            </p:childTnLst>
+                          </p:cTn>
+                        </p:par>
+                      </p:childTnLst>
+                    </p:cTn>
+                  </p:par>
+                  <p:par>
+                    <p:cTn id="14" fill="hold">
+                      <p:stCondLst>
+                        <p:cond delay="indefinite"/>
+                      </p:stCondLst>
+                      <p:childTnLst>
+                        <p:par>
+                          <p:cTn id="15" fill="hold">
+                            <p:stCondLst>
+                              <p:cond delay="0"/>
+                            </p:stCondLst>
+                            <p:childTnLst>
+                              <p:par>
+                                <p:cTn id="16" presetID="10" presetClass="entr" presetSubtype="0" fill="hold" nodeType="clickEffect">
+                                  <p:stCondLst>
+                                    <p:cond delay="0"/>
+                                  </p:stCondLst>
+                                  <p:childTnLst>
+                                    <p:set>
+                                      <p:cBhvr>
+                                        <p:cTn id="17" dur="1" fill="hold">
+                                          <p:stCondLst>
+                                            <p:cond delay="0"/>
+                                          </p:stCondLst>
+                                        </p:cTn>
+                                        <p:tgtEl>
+                                          <p:spTgt spid="3">
+                                            <p:txEl>
+                                              <p:pRg st="4" end="4"/>
+                                            </p:txEl>
+                                          </p:spTgt>
+                                        </p:tgtEl>
+                                        <p:attrNameLst>
+                                          <p:attrName>style.visibility</p:attrName>
+                                        </p:attrNameLst>
+                                      </p:cBhvr>
+                                      <p:to>
+                                        <p:strVal val="visible"/>
+                                      </p:to>
+                                    </p:set>
+                                    <p:animEffect transition="in" filter="fade">
+                                      <p:cBhvr>
+                                        <p:cTn id="18" dur="2000"/>
+                                        <p:tgtEl>
+                                          <p:spTgt spid="3">
+                                            <p:txEl>
+                                              <p:pRg st="4" end="4"/>
+                                            </p:txEl>
+                                          </p:spTgt>
+                                        </p:tgtEl>
+                                      </p:cBhvr>
+                                    </p:animEffect>
+                                  </p:childTnLst>
+                                </p:cTn>
+                              </p:par>
+                              <p:par>
+                                <p:cTn id="19" presetID="10" presetClass="entr" presetSubtype="0" fill="hold" nodeType="withEffect">
+                                  <p:stCondLst>
+                                    <p:cond delay="0"/>
+                                  </p:stCondLst>
+                                  <p:childTnLst>
+                                    <p:set>
+                                      <p:cBhvr>
+                                        <p:cTn id="20" dur="1" fill="hold">
+                                          <p:stCondLst>
+                                            <p:cond delay="0"/>
+                                          </p:stCondLst>
+                                        </p:cTn>
+                                        <p:tgtEl>
+                                          <p:spTgt spid="3">
+                                            <p:txEl>
+                                              <p:pRg st="5" end="5"/>
+                                            </p:txEl>
+                                          </p:spTgt>
+                                        </p:tgtEl>
+                                        <p:attrNameLst>
+                                          <p:attrName>style.visibility</p:attrName>
+                                        </p:attrNameLst>
+                                      </p:cBhvr>
+                                      <p:to>
+                                        <p:strVal val="visible"/>
+                                      </p:to>
+                                    </p:set>
+                                    <p:animEffect transition="in" filter="fade">
+                                      <p:cBhvr>
+                                        <p:cTn id="21" dur="2000"/>
+                                        <p:tgtEl>
+                                          <p:spTgt spid="3">
+                                            <p:txEl>
+                                              <p:pRg st="5" end="5"/>
+                                            </p:txEl>
+                                          </p:spTgt>
+                                        </p:tgtEl>
+                                      </p:cBhvr>
+                                    </p:animEffect>
+                                  </p:childTnLst>
+                                </p:cTn>
+                              </p:par>
+                              <p:par>
+                                <p:cTn id="22" presetID="10" presetClass="entr" presetSubtype="0" fill="hold" nodeType="withEffect">
+                                  <p:stCondLst>
+                                    <p:cond delay="0"/>
+                                  </p:stCondLst>
+                                  <p:childTnLst>
+                                    <p:set>
+                                      <p:cBhvr>
+                                        <p:cTn id="23" dur="1" fill="hold">
+                                          <p:stCondLst>
+                                            <p:cond delay="0"/>
+                                          </p:stCondLst>
+                                        </p:cTn>
+                                        <p:tgtEl>
+                                          <p:spTgt spid="3">
+                                            <p:txEl>
+                                              <p:pRg st="6" end="6"/>
+                                            </p:txEl>
+                                          </p:spTgt>
+                                        </p:tgtEl>
+                                        <p:attrNameLst>
+                                          <p:attrName>style.visibility</p:attrName>
+                                        </p:attrNameLst>
+                                      </p:cBhvr>
+                                      <p:to>
+                                        <p:strVal val="visible"/>
+                                      </p:to>
+                                    </p:set>
+                                    <p:animEffect transition="in" filter="fade">
+                                      <p:cBhvr>
+                                        <p:cTn id="24" dur="2000"/>
+                                        <p:tgtEl>
+                                          <p:spTgt spid="3">
+                                            <p:txEl>
+                                              <p:pRg st="6" end="6"/>
+                                            </p:txEl>
+                                          </p:spTgt>
+                                        </p:tgtEl>
+                                      </p:cBhvr>
+                                    </p:animEffect>
+                                  </p:childTnLst>
+                                </p:cTn>
+                              </p:par>
+                              <p:par>
+                                <p:cTn id="25" presetID="10" presetClass="entr" presetSubtype="0" fill="hold" nodeType="withEffect">
+                                  <p:stCondLst>
+                                    <p:cond delay="0"/>
+                                  </p:stCondLst>
+                                  <p:childTnLst>
+                                    <p:set>
+                                      <p:cBhvr>
+                                        <p:cTn id="26" dur="1" fill="hold">
+                                          <p:stCondLst>
+                                            <p:cond delay="0"/>
+                                          </p:stCondLst>
+                                        </p:cTn>
+                                        <p:tgtEl>
+                                          <p:spTgt spid="3">
+                                            <p:txEl>
+                                              <p:pRg st="7" end="7"/>
+                                            </p:txEl>
+                                          </p:spTgt>
+                                        </p:tgtEl>
+                                        <p:attrNameLst>
+                                          <p:attrName>style.visibility</p:attrName>
+                                        </p:attrNameLst>
+                                      </p:cBhvr>
+                                      <p:to>
+                                        <p:strVal val="visible"/>
+                                      </p:to>
+                                    </p:set>
+                                    <p:animEffect transition="in" filter="fade">
+                                      <p:cBhvr>
+                                        <p:cTn id="27" dur="2000"/>
+                                        <p:tgtEl>
+                                          <p:spTgt spid="3">
+                                            <p:txEl>
+                                              <p:pRg st="7" end="7"/>
+                                            </p:txEl>
+                                          </p:spTgt>
+                                        </p:tgtEl>
+                                      </p:cBhvr>
+                                    </p:animEffect>
+                                  </p:childTnLst>
+                                </p:cTn>
+                              </p:par>
+                              <p:par>
+                                <p:cTn id="28" presetID="10" presetClass="entr" presetSubtype="0" fill="hold" nodeType="withEffect">
+                                  <p:stCondLst>
+                                    <p:cond delay="0"/>
+                                  </p:stCondLst>
+                                  <p:childTnLst>
+                                    <p:set>
+                                      <p:cBhvr>
+                                        <p:cTn id="29" dur="1" fill="hold">
+                                          <p:stCondLst>
+                                            <p:cond delay="0"/>
+                                          </p:stCondLst>
+                                        </p:cTn>
+                                        <p:tgtEl>
+                                          <p:spTgt spid="3">
+                                            <p:txEl>
+                                              <p:pRg st="8" end="8"/>
+                                            </p:txEl>
+                                          </p:spTgt>
+                                        </p:tgtEl>
+                                        <p:attrNameLst>
+                                          <p:attrName>style.visibility</p:attrName>
+                                        </p:attrNameLst>
+                                      </p:cBhvr>
+                                      <p:to>
+                                        <p:strVal val="visible"/>
+                                      </p:to>
+                                    </p:set>
+                                    <p:animEffect transition="in" filter="fade">
+                                      <p:cBhvr>
+                                        <p:cTn id="30" dur="2000"/>
+                                        <p:tgtEl>
+                                          <p:spTgt spid="3">
+                                            <p:txEl>
+                                              <p:pRg st="8" end="8"/>
+                                            </p:txEl>
+                                          </p:spTgt>
+                                        </p:tgtEl>
+                                      </p:cBhvr>
+                                    </p:animEffect>
+                                  </p:childTnLst>
+                                </p:cTn>
+                              </p:par>
+                              <p:par>
+                                <p:cTn id="31" presetID="10" presetClass="entr" presetSubtype="0" fill="hold" nodeType="withEffect">
+                                  <p:stCondLst>
+                                    <p:cond delay="0"/>
+                                  </p:stCondLst>
+                                  <p:childTnLst>
+                                    <p:set>
+                                      <p:cBhvr>
+                                        <p:cTn id="32" dur="1" fill="hold">
+                                          <p:stCondLst>
+                                            <p:cond delay="0"/>
+                                          </p:stCondLst>
+                                        </p:cTn>
+                                        <p:tgtEl>
+                                          <p:spTgt spid="3">
+                                            <p:txEl>
+                                              <p:pRg st="9" end="9"/>
+                                            </p:txEl>
+                                          </p:spTgt>
+                                        </p:tgtEl>
+                                        <p:attrNameLst>
+                                          <p:attrName>style.visibility</p:attrName>
+                                        </p:attrNameLst>
+                                      </p:cBhvr>
+                                      <p:to>
+                                        <p:strVal val="visible"/>
+                                      </p:to>
+                                    </p:set>
+                                    <p:animEffect transition="in" filter="fade">
+                                      <p:cBhvr>
+                                        <p:cTn id="33" dur="2000"/>
+                                        <p:tgtEl>
+                                          <p:spTgt spid="3">
+                                            <p:txEl>
+                                              <p:pRg st="9" end="9"/>
+                                            </p:txEl>
+                                          </p:spTgt>
+                                        </p:tgtEl>
+                                      </p:cBhvr>
+                                    </p:animEffect>
+                                  </p:childTnLst>
+                                </p:cTn>
+                              </p:par>
+                            </p:childTnLst>
+                          </p:cTn>
+                        </p:par>
+                      </p:childTnLst>
+                    </p:cTn>
+                  </p:par>
+                </p:childTnLst>
+              </p:cTn>
+              <p:prevCondLst>
+                <p:cond evt="onPrev" delay="0">
+                  <p:tgtEl>
+                    <p:sldTgt/>
+                  </p:tgtEl>
+                </p:cond>
+              </p:prevCondLst>
+              <p:nextCondLst>
+                <p:cond evt="onNext" delay="0">
+                  <p:tgtEl>
+                    <p:sldTgt/>
+                  </p:tgtEl>
+                </p:cond>
+              </p:nextCondLst>
+            </p:seq>
+          </p:childTnLst>
+        </p:cTn>
       </p:par>
     </p:tnLst>
   </p:timing>
@@ -16086,7 +16526,367 @@
   <p:timing>
     <p:tnLst>
       <p:par>
-        <p:cTn id="1" dur="indefinite" restart="never" nodeType="tmRoot"/>
+        <p:cTn id="1" dur="indefinite" restart="never" nodeType="tmRoot">
+          <p:childTnLst>
+            <p:seq concurrent="1" nextAc="seek">
+              <p:cTn id="2" dur="indefinite" nodeType="mainSeq">
+                <p:childTnLst>
+                  <p:par>
+                    <p:cTn id="3" fill="hold">
+                      <p:stCondLst>
+                        <p:cond delay="indefinite"/>
+                      </p:stCondLst>
+                      <p:childTnLst>
+                        <p:par>
+                          <p:cTn id="4" fill="hold">
+                            <p:stCondLst>
+                              <p:cond delay="0"/>
+                            </p:stCondLst>
+                            <p:childTnLst>
+                              <p:par>
+                                <p:cTn id="5" presetID="10" presetClass="entr" presetSubtype="0" fill="hold" nodeType="clickEffect">
+                                  <p:stCondLst>
+                                    <p:cond delay="0"/>
+                                  </p:stCondLst>
+                                  <p:childTnLst>
+                                    <p:set>
+                                      <p:cBhvr>
+                                        <p:cTn id="6" dur="1" fill="hold">
+                                          <p:stCondLst>
+                                            <p:cond delay="0"/>
+                                          </p:stCondLst>
+                                        </p:cTn>
+                                        <p:tgtEl>
+                                          <p:spTgt spid="3">
+                                            <p:txEl>
+                                              <p:pRg st="1" end="1"/>
+                                            </p:txEl>
+                                          </p:spTgt>
+                                        </p:tgtEl>
+                                        <p:attrNameLst>
+                                          <p:attrName>style.visibility</p:attrName>
+                                        </p:attrNameLst>
+                                      </p:cBhvr>
+                                      <p:to>
+                                        <p:strVal val="visible"/>
+                                      </p:to>
+                                    </p:set>
+                                    <p:animEffect transition="in" filter="fade">
+                                      <p:cBhvr>
+                                        <p:cTn id="7" dur="2000"/>
+                                        <p:tgtEl>
+                                          <p:spTgt spid="3">
+                                            <p:txEl>
+                                              <p:pRg st="1" end="1"/>
+                                            </p:txEl>
+                                          </p:spTgt>
+                                        </p:tgtEl>
+                                      </p:cBhvr>
+                                    </p:animEffect>
+                                  </p:childTnLst>
+                                </p:cTn>
+                              </p:par>
+                              <p:par>
+                                <p:cTn id="8" presetID="10" presetClass="entr" presetSubtype="0" fill="hold" nodeType="withEffect">
+                                  <p:stCondLst>
+                                    <p:cond delay="0"/>
+                                  </p:stCondLst>
+                                  <p:childTnLst>
+                                    <p:set>
+                                      <p:cBhvr>
+                                        <p:cTn id="9" dur="1" fill="hold">
+                                          <p:stCondLst>
+                                            <p:cond delay="0"/>
+                                          </p:stCondLst>
+                                        </p:cTn>
+                                        <p:tgtEl>
+                                          <p:spTgt spid="3">
+                                            <p:txEl>
+                                              <p:pRg st="2" end="2"/>
+                                            </p:txEl>
+                                          </p:spTgt>
+                                        </p:tgtEl>
+                                        <p:attrNameLst>
+                                          <p:attrName>style.visibility</p:attrName>
+                                        </p:attrNameLst>
+                                      </p:cBhvr>
+                                      <p:to>
+                                        <p:strVal val="visible"/>
+                                      </p:to>
+                                    </p:set>
+                                    <p:animEffect transition="in" filter="fade">
+                                      <p:cBhvr>
+                                        <p:cTn id="10" dur="2000"/>
+                                        <p:tgtEl>
+                                          <p:spTgt spid="3">
+                                            <p:txEl>
+                                              <p:pRg st="2" end="2"/>
+                                            </p:txEl>
+                                          </p:spTgt>
+                                        </p:tgtEl>
+                                      </p:cBhvr>
+                                    </p:animEffect>
+                                  </p:childTnLst>
+                                </p:cTn>
+                              </p:par>
+                              <p:par>
+                                <p:cTn id="11" presetID="10" presetClass="entr" presetSubtype="0" fill="hold" nodeType="withEffect">
+                                  <p:stCondLst>
+                                    <p:cond delay="0"/>
+                                  </p:stCondLst>
+                                  <p:childTnLst>
+                                    <p:set>
+                                      <p:cBhvr>
+                                        <p:cTn id="12" dur="1" fill="hold">
+                                          <p:stCondLst>
+                                            <p:cond delay="0"/>
+                                          </p:stCondLst>
+                                        </p:cTn>
+                                        <p:tgtEl>
+                                          <p:spTgt spid="3">
+                                            <p:txEl>
+                                              <p:pRg st="3" end="3"/>
+                                            </p:txEl>
+                                          </p:spTgt>
+                                        </p:tgtEl>
+                                        <p:attrNameLst>
+                                          <p:attrName>style.visibility</p:attrName>
+                                        </p:attrNameLst>
+                                      </p:cBhvr>
+                                      <p:to>
+                                        <p:strVal val="visible"/>
+                                      </p:to>
+                                    </p:set>
+                                    <p:animEffect transition="in" filter="fade">
+                                      <p:cBhvr>
+                                        <p:cTn id="13" dur="2000"/>
+                                        <p:tgtEl>
+                                          <p:spTgt spid="3">
+                                            <p:txEl>
+                                              <p:pRg st="3" end="3"/>
+                                            </p:txEl>
+                                          </p:spTgt>
+                                        </p:tgtEl>
+                                      </p:cBhvr>
+                                    </p:animEffect>
+                                  </p:childTnLst>
+                                </p:cTn>
+                              </p:par>
+                            </p:childTnLst>
+                          </p:cTn>
+                        </p:par>
+                      </p:childTnLst>
+                    </p:cTn>
+                  </p:par>
+                  <p:par>
+                    <p:cTn id="14" fill="hold">
+                      <p:stCondLst>
+                        <p:cond delay="indefinite"/>
+                      </p:stCondLst>
+                      <p:childTnLst>
+                        <p:par>
+                          <p:cTn id="15" fill="hold">
+                            <p:stCondLst>
+                              <p:cond delay="0"/>
+                            </p:stCondLst>
+                            <p:childTnLst>
+                              <p:par>
+                                <p:cTn id="16" presetID="10" presetClass="entr" presetSubtype="0" fill="hold" nodeType="clickEffect">
+                                  <p:stCondLst>
+                                    <p:cond delay="0"/>
+                                  </p:stCondLst>
+                                  <p:childTnLst>
+                                    <p:set>
+                                      <p:cBhvr>
+                                        <p:cTn id="17" dur="1" fill="hold">
+                                          <p:stCondLst>
+                                            <p:cond delay="0"/>
+                                          </p:stCondLst>
+                                        </p:cTn>
+                                        <p:tgtEl>
+                                          <p:spTgt spid="3">
+                                            <p:txEl>
+                                              <p:pRg st="4" end="4"/>
+                                            </p:txEl>
+                                          </p:spTgt>
+                                        </p:tgtEl>
+                                        <p:attrNameLst>
+                                          <p:attrName>style.visibility</p:attrName>
+                                        </p:attrNameLst>
+                                      </p:cBhvr>
+                                      <p:to>
+                                        <p:strVal val="visible"/>
+                                      </p:to>
+                                    </p:set>
+                                    <p:animEffect transition="in" filter="fade">
+                                      <p:cBhvr>
+                                        <p:cTn id="18" dur="2000"/>
+                                        <p:tgtEl>
+                                          <p:spTgt spid="3">
+                                            <p:txEl>
+                                              <p:pRg st="4" end="4"/>
+                                            </p:txEl>
+                                          </p:spTgt>
+                                        </p:tgtEl>
+                                      </p:cBhvr>
+                                    </p:animEffect>
+                                  </p:childTnLst>
+                                </p:cTn>
+                              </p:par>
+                              <p:par>
+                                <p:cTn id="19" presetID="10" presetClass="entr" presetSubtype="0" fill="hold" nodeType="withEffect">
+                                  <p:stCondLst>
+                                    <p:cond delay="0"/>
+                                  </p:stCondLst>
+                                  <p:childTnLst>
+                                    <p:set>
+                                      <p:cBhvr>
+                                        <p:cTn id="20" dur="1" fill="hold">
+                                          <p:stCondLst>
+                                            <p:cond delay="0"/>
+                                          </p:stCondLst>
+                                        </p:cTn>
+                                        <p:tgtEl>
+                                          <p:spTgt spid="3">
+                                            <p:txEl>
+                                              <p:pRg st="5" end="5"/>
+                                            </p:txEl>
+                                          </p:spTgt>
+                                        </p:tgtEl>
+                                        <p:attrNameLst>
+                                          <p:attrName>style.visibility</p:attrName>
+                                        </p:attrNameLst>
+                                      </p:cBhvr>
+                                      <p:to>
+                                        <p:strVal val="visible"/>
+                                      </p:to>
+                                    </p:set>
+                                    <p:animEffect transition="in" filter="fade">
+                                      <p:cBhvr>
+                                        <p:cTn id="21" dur="2000"/>
+                                        <p:tgtEl>
+                                          <p:spTgt spid="3">
+                                            <p:txEl>
+                                              <p:pRg st="5" end="5"/>
+                                            </p:txEl>
+                                          </p:spTgt>
+                                        </p:tgtEl>
+                                      </p:cBhvr>
+                                    </p:animEffect>
+                                  </p:childTnLst>
+                                </p:cTn>
+                              </p:par>
+                              <p:par>
+                                <p:cTn id="22" presetID="10" presetClass="entr" presetSubtype="0" fill="hold" nodeType="withEffect">
+                                  <p:stCondLst>
+                                    <p:cond delay="0"/>
+                                  </p:stCondLst>
+                                  <p:childTnLst>
+                                    <p:set>
+                                      <p:cBhvr>
+                                        <p:cTn id="23" dur="1" fill="hold">
+                                          <p:stCondLst>
+                                            <p:cond delay="0"/>
+                                          </p:stCondLst>
+                                        </p:cTn>
+                                        <p:tgtEl>
+                                          <p:spTgt spid="3">
+                                            <p:txEl>
+                                              <p:pRg st="6" end="6"/>
+                                            </p:txEl>
+                                          </p:spTgt>
+                                        </p:tgtEl>
+                                        <p:attrNameLst>
+                                          <p:attrName>style.visibility</p:attrName>
+                                        </p:attrNameLst>
+                                      </p:cBhvr>
+                                      <p:to>
+                                        <p:strVal val="visible"/>
+                                      </p:to>
+                                    </p:set>
+                                    <p:animEffect transition="in" filter="fade">
+                                      <p:cBhvr>
+                                        <p:cTn id="24" dur="2000"/>
+                                        <p:tgtEl>
+                                          <p:spTgt spid="3">
+                                            <p:txEl>
+                                              <p:pRg st="6" end="6"/>
+                                            </p:txEl>
+                                          </p:spTgt>
+                                        </p:tgtEl>
+                                      </p:cBhvr>
+                                    </p:animEffect>
+                                  </p:childTnLst>
+                                </p:cTn>
+                              </p:par>
+                              <p:par>
+                                <p:cTn id="25" presetID="10" presetClass="entr" presetSubtype="0" fill="hold" nodeType="withEffect">
+                                  <p:stCondLst>
+                                    <p:cond delay="0"/>
+                                  </p:stCondLst>
+                                  <p:childTnLst>
+                                    <p:set>
+                                      <p:cBhvr>
+                                        <p:cTn id="26" dur="1" fill="hold">
+                                          <p:stCondLst>
+                                            <p:cond delay="0"/>
+                                          </p:stCondLst>
+                                        </p:cTn>
+                                        <p:tgtEl>
+                                          <p:spTgt spid="3">
+                                            <p:txEl>
+                                              <p:pRg st="7" end="7"/>
+                                            </p:txEl>
+                                          </p:spTgt>
+                                        </p:tgtEl>
+                                        <p:attrNameLst>
+                                          <p:attrName>style.visibility</p:attrName>
+                                        </p:attrNameLst>
+                                      </p:cBhvr>
+                                      <p:to>
+                                        <p:strVal val="visible"/>
+                                      </p:to>
+                                    </p:set>
+                                    <p:animEffect transition="in" filter="fade">
+                                      <p:cBhvr>
+                                        <p:cTn id="27" dur="2000"/>
+                                        <p:tgtEl>
+                                          <p:spTgt spid="3">
+                                            <p:txEl>
+                                              <p:pRg st="7" end="7"/>
+                                            </p:txEl>
+                                          </p:spTgt>
+                                        </p:tgtEl>
+                                      </p:cBhvr>
+                                    </p:animEffect>
+                                  </p:childTnLst>
+                                </p:cTn>
+                              </p:par>
+                            </p:childTnLst>
+                          </p:cTn>
+                        </p:par>
+                      </p:childTnLst>
+                    </p:cTn>
+                  </p:par>
+                </p:childTnLst>
+              </p:cTn>
+              <p:prevCondLst>
+                <p:cond evt="onPrev" delay="0">
+                  <p:tgtEl>
+                    <p:sldTgt/>
+                  </p:tgtEl>
+                </p:cond>
+              </p:prevCondLst>
+              <p:nextCondLst>
+                <p:cond evt="onNext" delay="0">
+                  <p:tgtEl>
+                    <p:sldTgt/>
+                  </p:tgtEl>
+                </p:cond>
+              </p:nextCondLst>
+            </p:seq>
+          </p:childTnLst>
+        </p:cTn>
       </p:par>
     </p:tnLst>
   </p:timing>
@@ -16316,44 +17116,35 @@
               <a:rPr lang="en-US" sz="2000" dirty="0" smtClean="0">
                 <a:latin typeface="Consolas" pitchFamily="49" charset="0"/>
               </a:rPr>
-              <a:t>(x =&gt; other</a:t>
+              <a:t>(x =&gt; other)</a:t>
+            </a:r>
+          </a:p>
+          <a:p>
+            <a:pPr lvl="1"/>
+            <a:r>
+              <a:rPr lang="en-US" sz="2000" dirty="0" err="1" smtClean="0">
+                <a:latin typeface="Consolas" pitchFamily="49" charset="0"/>
+              </a:rPr>
+              <a:t>EnumerableEx.For</a:t>
             </a:r>
             <a:r>
               <a:rPr lang="en-US" sz="2000" dirty="0" smtClean="0">
                 <a:latin typeface="Consolas" pitchFamily="49" charset="0"/>
               </a:rPr>
+              <a:t>(source, </a:t>
+            </a:r>
+            <a:r>
+              <a:rPr lang="en-US" sz="2000" dirty="0" err="1" smtClean="0">
+                <a:latin typeface="Consolas" pitchFamily="49" charset="0"/>
+              </a:rPr>
+              <a:t>resultSelector</a:t>
+            </a:r>
+            <a:r>
+              <a:rPr lang="en-US" sz="2000" dirty="0" smtClean="0">
+                <a:latin typeface="Consolas" pitchFamily="49" charset="0"/>
+              </a:rPr>
               <a:t>)</a:t>
             </a:r>
-          </a:p>
-          <a:p>
-            <a:pPr lvl="1"/>
-            <a:r>
-              <a:rPr lang="en-US" sz="2000" dirty="0" err="1" smtClean="0">
-                <a:latin typeface="Consolas" pitchFamily="49" charset="0"/>
-              </a:rPr>
-              <a:t>EnumerableEx.For</a:t>
-            </a:r>
-            <a:r>
-              <a:rPr lang="en-US" sz="2000" dirty="0" smtClean="0">
-                <a:latin typeface="Consolas" pitchFamily="49" charset="0"/>
-              </a:rPr>
-              <a:t>(source, </a:t>
-            </a:r>
-            <a:r>
-              <a:rPr lang="en-US" sz="2000" dirty="0" err="1" smtClean="0">
-                <a:latin typeface="Consolas" pitchFamily="49" charset="0"/>
-              </a:rPr>
-              <a:t>resultSelector</a:t>
-            </a:r>
-            <a:r>
-              <a:rPr lang="en-US" sz="2000" dirty="0" smtClean="0">
-                <a:latin typeface="Consolas" pitchFamily="49" charset="0"/>
-              </a:rPr>
-              <a:t>)</a:t>
-            </a:r>
-            <a:endParaRPr lang="en-US" sz="2000" dirty="0" smtClean="0">
-              <a:latin typeface="Consolas" pitchFamily="49" charset="0"/>
-            </a:endParaRPr>
           </a:p>
         </p:txBody>
       </p:sp>
@@ -16368,7 +17159,410 @@
   <p:timing>
     <p:tnLst>
       <p:par>
-        <p:cTn id="1" dur="indefinite" restart="never" nodeType="tmRoot"/>
+        <p:cTn id="1" dur="indefinite" restart="never" nodeType="tmRoot">
+          <p:childTnLst>
+            <p:seq concurrent="1" nextAc="seek">
+              <p:cTn id="2" dur="indefinite" nodeType="mainSeq">
+                <p:childTnLst>
+                  <p:par>
+                    <p:cTn id="3" fill="hold">
+                      <p:stCondLst>
+                        <p:cond delay="indefinite"/>
+                      </p:stCondLst>
+                      <p:childTnLst>
+                        <p:par>
+                          <p:cTn id="4" fill="hold">
+                            <p:stCondLst>
+                              <p:cond delay="0"/>
+                            </p:stCondLst>
+                            <p:childTnLst>
+                              <p:par>
+                                <p:cTn id="5" presetID="10" presetClass="entr" presetSubtype="0" fill="hold" nodeType="clickEffect">
+                                  <p:stCondLst>
+                                    <p:cond delay="0"/>
+                                  </p:stCondLst>
+                                  <p:childTnLst>
+                                    <p:set>
+                                      <p:cBhvr>
+                                        <p:cTn id="6" dur="1" fill="hold">
+                                          <p:stCondLst>
+                                            <p:cond delay="0"/>
+                                          </p:stCondLst>
+                                        </p:cTn>
+                                        <p:tgtEl>
+                                          <p:spTgt spid="3">
+                                            <p:txEl>
+                                              <p:pRg st="1" end="1"/>
+                                            </p:txEl>
+                                          </p:spTgt>
+                                        </p:tgtEl>
+                                        <p:attrNameLst>
+                                          <p:attrName>style.visibility</p:attrName>
+                                        </p:attrNameLst>
+                                      </p:cBhvr>
+                                      <p:to>
+                                        <p:strVal val="visible"/>
+                                      </p:to>
+                                    </p:set>
+                                    <p:animEffect transition="in" filter="fade">
+                                      <p:cBhvr>
+                                        <p:cTn id="7" dur="2000"/>
+                                        <p:tgtEl>
+                                          <p:spTgt spid="3">
+                                            <p:txEl>
+                                              <p:pRg st="1" end="1"/>
+                                            </p:txEl>
+                                          </p:spTgt>
+                                        </p:tgtEl>
+                                      </p:cBhvr>
+                                    </p:animEffect>
+                                  </p:childTnLst>
+                                </p:cTn>
+                              </p:par>
+                              <p:par>
+                                <p:cTn id="8" presetID="10" presetClass="entr" presetSubtype="0" fill="hold" nodeType="withEffect">
+                                  <p:stCondLst>
+                                    <p:cond delay="0"/>
+                                  </p:stCondLst>
+                                  <p:childTnLst>
+                                    <p:set>
+                                      <p:cBhvr>
+                                        <p:cTn id="9" dur="1" fill="hold">
+                                          <p:stCondLst>
+                                            <p:cond delay="0"/>
+                                          </p:stCondLst>
+                                        </p:cTn>
+                                        <p:tgtEl>
+                                          <p:spTgt spid="3">
+                                            <p:txEl>
+                                              <p:pRg st="2" end="2"/>
+                                            </p:txEl>
+                                          </p:spTgt>
+                                        </p:tgtEl>
+                                        <p:attrNameLst>
+                                          <p:attrName>style.visibility</p:attrName>
+                                        </p:attrNameLst>
+                                      </p:cBhvr>
+                                      <p:to>
+                                        <p:strVal val="visible"/>
+                                      </p:to>
+                                    </p:set>
+                                    <p:animEffect transition="in" filter="fade">
+                                      <p:cBhvr>
+                                        <p:cTn id="10" dur="2000"/>
+                                        <p:tgtEl>
+                                          <p:spTgt spid="3">
+                                            <p:txEl>
+                                              <p:pRg st="2" end="2"/>
+                                            </p:txEl>
+                                          </p:spTgt>
+                                        </p:tgtEl>
+                                      </p:cBhvr>
+                                    </p:animEffect>
+                                  </p:childTnLst>
+                                </p:cTn>
+                              </p:par>
+                              <p:par>
+                                <p:cTn id="11" presetID="10" presetClass="entr" presetSubtype="0" fill="hold" nodeType="withEffect">
+                                  <p:stCondLst>
+                                    <p:cond delay="0"/>
+                                  </p:stCondLst>
+                                  <p:childTnLst>
+                                    <p:set>
+                                      <p:cBhvr>
+                                        <p:cTn id="12" dur="1" fill="hold">
+                                          <p:stCondLst>
+                                            <p:cond delay="0"/>
+                                          </p:stCondLst>
+                                        </p:cTn>
+                                        <p:tgtEl>
+                                          <p:spTgt spid="3">
+                                            <p:txEl>
+                                              <p:pRg st="3" end="3"/>
+                                            </p:txEl>
+                                          </p:spTgt>
+                                        </p:tgtEl>
+                                        <p:attrNameLst>
+                                          <p:attrName>style.visibility</p:attrName>
+                                        </p:attrNameLst>
+                                      </p:cBhvr>
+                                      <p:to>
+                                        <p:strVal val="visible"/>
+                                      </p:to>
+                                    </p:set>
+                                    <p:animEffect transition="in" filter="fade">
+                                      <p:cBhvr>
+                                        <p:cTn id="13" dur="2000"/>
+                                        <p:tgtEl>
+                                          <p:spTgt spid="3">
+                                            <p:txEl>
+                                              <p:pRg st="3" end="3"/>
+                                            </p:txEl>
+                                          </p:spTgt>
+                                        </p:tgtEl>
+                                      </p:cBhvr>
+                                    </p:animEffect>
+                                  </p:childTnLst>
+                                </p:cTn>
+                              </p:par>
+                            </p:childTnLst>
+                          </p:cTn>
+                        </p:par>
+                      </p:childTnLst>
+                    </p:cTn>
+                  </p:par>
+                  <p:par>
+                    <p:cTn id="14" fill="hold">
+                      <p:stCondLst>
+                        <p:cond delay="indefinite"/>
+                      </p:stCondLst>
+                      <p:childTnLst>
+                        <p:par>
+                          <p:cTn id="15" fill="hold">
+                            <p:stCondLst>
+                              <p:cond delay="0"/>
+                            </p:stCondLst>
+                            <p:childTnLst>
+                              <p:par>
+                                <p:cTn id="16" presetID="10" presetClass="entr" presetSubtype="0" fill="hold" nodeType="clickEffect">
+                                  <p:stCondLst>
+                                    <p:cond delay="0"/>
+                                  </p:stCondLst>
+                                  <p:childTnLst>
+                                    <p:set>
+                                      <p:cBhvr>
+                                        <p:cTn id="17" dur="1" fill="hold">
+                                          <p:stCondLst>
+                                            <p:cond delay="0"/>
+                                          </p:stCondLst>
+                                        </p:cTn>
+                                        <p:tgtEl>
+                                          <p:spTgt spid="3">
+                                            <p:txEl>
+                                              <p:pRg st="4" end="4"/>
+                                            </p:txEl>
+                                          </p:spTgt>
+                                        </p:tgtEl>
+                                        <p:attrNameLst>
+                                          <p:attrName>style.visibility</p:attrName>
+                                        </p:attrNameLst>
+                                      </p:cBhvr>
+                                      <p:to>
+                                        <p:strVal val="visible"/>
+                                      </p:to>
+                                    </p:set>
+                                    <p:animEffect transition="in" filter="fade">
+                                      <p:cBhvr>
+                                        <p:cTn id="18" dur="2000"/>
+                                        <p:tgtEl>
+                                          <p:spTgt spid="3">
+                                            <p:txEl>
+                                              <p:pRg st="4" end="4"/>
+                                            </p:txEl>
+                                          </p:spTgt>
+                                        </p:tgtEl>
+                                      </p:cBhvr>
+                                    </p:animEffect>
+                                  </p:childTnLst>
+                                </p:cTn>
+                              </p:par>
+                              <p:par>
+                                <p:cTn id="19" presetID="10" presetClass="entr" presetSubtype="0" fill="hold" nodeType="withEffect">
+                                  <p:stCondLst>
+                                    <p:cond delay="0"/>
+                                  </p:stCondLst>
+                                  <p:childTnLst>
+                                    <p:set>
+                                      <p:cBhvr>
+                                        <p:cTn id="20" dur="1" fill="hold">
+                                          <p:stCondLst>
+                                            <p:cond delay="0"/>
+                                          </p:stCondLst>
+                                        </p:cTn>
+                                        <p:tgtEl>
+                                          <p:spTgt spid="3">
+                                            <p:txEl>
+                                              <p:pRg st="5" end="5"/>
+                                            </p:txEl>
+                                          </p:spTgt>
+                                        </p:tgtEl>
+                                        <p:attrNameLst>
+                                          <p:attrName>style.visibility</p:attrName>
+                                        </p:attrNameLst>
+                                      </p:cBhvr>
+                                      <p:to>
+                                        <p:strVal val="visible"/>
+                                      </p:to>
+                                    </p:set>
+                                    <p:animEffect transition="in" filter="fade">
+                                      <p:cBhvr>
+                                        <p:cTn id="21" dur="2000"/>
+                                        <p:tgtEl>
+                                          <p:spTgt spid="3">
+                                            <p:txEl>
+                                              <p:pRg st="5" end="5"/>
+                                            </p:txEl>
+                                          </p:spTgt>
+                                        </p:tgtEl>
+                                      </p:cBhvr>
+                                    </p:animEffect>
+                                  </p:childTnLst>
+                                </p:cTn>
+                              </p:par>
+                              <p:par>
+                                <p:cTn id="22" presetID="10" presetClass="entr" presetSubtype="0" fill="hold" nodeType="withEffect">
+                                  <p:stCondLst>
+                                    <p:cond delay="0"/>
+                                  </p:stCondLst>
+                                  <p:childTnLst>
+                                    <p:set>
+                                      <p:cBhvr>
+                                        <p:cTn id="23" dur="1" fill="hold">
+                                          <p:stCondLst>
+                                            <p:cond delay="0"/>
+                                          </p:stCondLst>
+                                        </p:cTn>
+                                        <p:tgtEl>
+                                          <p:spTgt spid="3">
+                                            <p:txEl>
+                                              <p:pRg st="6" end="6"/>
+                                            </p:txEl>
+                                          </p:spTgt>
+                                        </p:tgtEl>
+                                        <p:attrNameLst>
+                                          <p:attrName>style.visibility</p:attrName>
+                                        </p:attrNameLst>
+                                      </p:cBhvr>
+                                      <p:to>
+                                        <p:strVal val="visible"/>
+                                      </p:to>
+                                    </p:set>
+                                    <p:animEffect transition="in" filter="fade">
+                                      <p:cBhvr>
+                                        <p:cTn id="24" dur="2000"/>
+                                        <p:tgtEl>
+                                          <p:spTgt spid="3">
+                                            <p:txEl>
+                                              <p:pRg st="6" end="6"/>
+                                            </p:txEl>
+                                          </p:spTgt>
+                                        </p:tgtEl>
+                                      </p:cBhvr>
+                                    </p:animEffect>
+                                  </p:childTnLst>
+                                </p:cTn>
+                              </p:par>
+                              <p:par>
+                                <p:cTn id="25" presetID="10" presetClass="entr" presetSubtype="0" fill="hold" nodeType="withEffect">
+                                  <p:stCondLst>
+                                    <p:cond delay="0"/>
+                                  </p:stCondLst>
+                                  <p:childTnLst>
+                                    <p:set>
+                                      <p:cBhvr>
+                                        <p:cTn id="26" dur="1" fill="hold">
+                                          <p:stCondLst>
+                                            <p:cond delay="0"/>
+                                          </p:stCondLst>
+                                        </p:cTn>
+                                        <p:tgtEl>
+                                          <p:spTgt spid="3">
+                                            <p:txEl>
+                                              <p:pRg st="7" end="7"/>
+                                            </p:txEl>
+                                          </p:spTgt>
+                                        </p:tgtEl>
+                                        <p:attrNameLst>
+                                          <p:attrName>style.visibility</p:attrName>
+                                        </p:attrNameLst>
+                                      </p:cBhvr>
+                                      <p:to>
+                                        <p:strVal val="visible"/>
+                                      </p:to>
+                                    </p:set>
+                                    <p:animEffect transition="in" filter="fade">
+                                      <p:cBhvr>
+                                        <p:cTn id="27" dur="2000"/>
+                                        <p:tgtEl>
+                                          <p:spTgt spid="3">
+                                            <p:txEl>
+                                              <p:pRg st="7" end="7"/>
+                                            </p:txEl>
+                                          </p:spTgt>
+                                        </p:tgtEl>
+                                      </p:cBhvr>
+                                    </p:animEffect>
+                                  </p:childTnLst>
+                                </p:cTn>
+                              </p:par>
+                              <p:par>
+                                <p:cTn id="28" presetID="10" presetClass="entr" presetSubtype="0" fill="hold" nodeType="withEffect">
+                                  <p:stCondLst>
+                                    <p:cond delay="0"/>
+                                  </p:stCondLst>
+                                  <p:childTnLst>
+                                    <p:set>
+                                      <p:cBhvr>
+                                        <p:cTn id="29" dur="1" fill="hold">
+                                          <p:stCondLst>
+                                            <p:cond delay="0"/>
+                                          </p:stCondLst>
+                                        </p:cTn>
+                                        <p:tgtEl>
+                                          <p:spTgt spid="3">
+                                            <p:txEl>
+                                              <p:pRg st="8" end="8"/>
+                                            </p:txEl>
+                                          </p:spTgt>
+                                        </p:tgtEl>
+                                        <p:attrNameLst>
+                                          <p:attrName>style.visibility</p:attrName>
+                                        </p:attrNameLst>
+                                      </p:cBhvr>
+                                      <p:to>
+                                        <p:strVal val="visible"/>
+                                      </p:to>
+                                    </p:set>
+                                    <p:animEffect transition="in" filter="fade">
+                                      <p:cBhvr>
+                                        <p:cTn id="30" dur="2000"/>
+                                        <p:tgtEl>
+                                          <p:spTgt spid="3">
+                                            <p:txEl>
+                                              <p:pRg st="8" end="8"/>
+                                            </p:txEl>
+                                          </p:spTgt>
+                                        </p:tgtEl>
+                                      </p:cBhvr>
+                                    </p:animEffect>
+                                  </p:childTnLst>
+                                </p:cTn>
+                              </p:par>
+                            </p:childTnLst>
+                          </p:cTn>
+                        </p:par>
+                      </p:childTnLst>
+                    </p:cTn>
+                  </p:par>
+                </p:childTnLst>
+              </p:cTn>
+              <p:prevCondLst>
+                <p:cond evt="onPrev" delay="0">
+                  <p:tgtEl>
+                    <p:sldTgt/>
+                  </p:tgtEl>
+                </p:cond>
+              </p:prevCondLst>
+              <p:nextCondLst>
+                <p:cond evt="onNext" delay="0">
+                  <p:tgtEl>
+                    <p:sldTgt/>
+                  </p:tgtEl>
+                </p:cond>
+              </p:nextCondLst>
+            </p:seq>
+          </p:childTnLst>
+        </p:cTn>
       </p:par>
     </p:tnLst>
   </p:timing>
@@ -16654,10 +17848,6 @@
             </a:r>
             <a:endParaRPr lang="en-US" sz="2000" dirty="0" smtClean="0"/>
           </a:p>
-          <a:p>
-            <a:pPr lvl="1"/>
-            <a:endParaRPr lang="en-US" sz="2000" dirty="0"/>
-          </a:p>
         </p:txBody>
       </p:sp>
     </p:spTree>
@@ -16671,7 +17861,177 @@
   <p:timing>
     <p:tnLst>
       <p:par>
-        <p:cTn id="1" dur="indefinite" restart="never" nodeType="tmRoot"/>
+        <p:cTn id="1" dur="indefinite" restart="never" nodeType="tmRoot">
+          <p:childTnLst>
+            <p:seq concurrent="1" nextAc="seek">
+              <p:cTn id="2" dur="indefinite" nodeType="mainSeq">
+                <p:childTnLst>
+                  <p:par>
+                    <p:cTn id="3" fill="hold">
+                      <p:stCondLst>
+                        <p:cond delay="indefinite"/>
+                      </p:stCondLst>
+                      <p:childTnLst>
+                        <p:par>
+                          <p:cTn id="4" fill="hold">
+                            <p:stCondLst>
+                              <p:cond delay="0"/>
+                            </p:stCondLst>
+                            <p:childTnLst>
+                              <p:par>
+                                <p:cTn id="5" presetID="10" presetClass="entr" presetSubtype="0" fill="hold" nodeType="clickEffect">
+                                  <p:stCondLst>
+                                    <p:cond delay="0"/>
+                                  </p:stCondLst>
+                                  <p:childTnLst>
+                                    <p:set>
+                                      <p:cBhvr>
+                                        <p:cTn id="6" dur="1" fill="hold">
+                                          <p:stCondLst>
+                                            <p:cond delay="0"/>
+                                          </p:stCondLst>
+                                        </p:cTn>
+                                        <p:tgtEl>
+                                          <p:spTgt spid="3">
+                                            <p:txEl>
+                                              <p:pRg st="4" end="4"/>
+                                            </p:txEl>
+                                          </p:spTgt>
+                                        </p:tgtEl>
+                                        <p:attrNameLst>
+                                          <p:attrName>style.visibility</p:attrName>
+                                        </p:attrNameLst>
+                                      </p:cBhvr>
+                                      <p:to>
+                                        <p:strVal val="visible"/>
+                                      </p:to>
+                                    </p:set>
+                                    <p:animEffect transition="in" filter="fade">
+                                      <p:cBhvr>
+                                        <p:cTn id="7" dur="2000"/>
+                                        <p:tgtEl>
+                                          <p:spTgt spid="3">
+                                            <p:txEl>
+                                              <p:pRg st="4" end="4"/>
+                                            </p:txEl>
+                                          </p:spTgt>
+                                        </p:tgtEl>
+                                      </p:cBhvr>
+                                    </p:animEffect>
+                                  </p:childTnLst>
+                                </p:cTn>
+                              </p:par>
+                              <p:par>
+                                <p:cTn id="8" presetID="10" presetClass="entr" presetSubtype="0" fill="hold" nodeType="withEffect">
+                                  <p:stCondLst>
+                                    <p:cond delay="0"/>
+                                  </p:stCondLst>
+                                  <p:childTnLst>
+                                    <p:set>
+                                      <p:cBhvr>
+                                        <p:cTn id="9" dur="1" fill="hold">
+                                          <p:stCondLst>
+                                            <p:cond delay="0"/>
+                                          </p:stCondLst>
+                                        </p:cTn>
+                                        <p:tgtEl>
+                                          <p:spTgt spid="3">
+                                            <p:txEl>
+                                              <p:pRg st="5" end="5"/>
+                                            </p:txEl>
+                                          </p:spTgt>
+                                        </p:tgtEl>
+                                        <p:attrNameLst>
+                                          <p:attrName>style.visibility</p:attrName>
+                                        </p:attrNameLst>
+                                      </p:cBhvr>
+                                      <p:to>
+                                        <p:strVal val="visible"/>
+                                      </p:to>
+                                    </p:set>
+                                    <p:animEffect transition="in" filter="fade">
+                                      <p:cBhvr>
+                                        <p:cTn id="10" dur="2000"/>
+                                        <p:tgtEl>
+                                          <p:spTgt spid="3">
+                                            <p:txEl>
+                                              <p:pRg st="5" end="5"/>
+                                            </p:txEl>
+                                          </p:spTgt>
+                                        </p:tgtEl>
+                                      </p:cBhvr>
+                                    </p:animEffect>
+                                  </p:childTnLst>
+                                </p:cTn>
+                              </p:par>
+                              <p:par>
+                                <p:cTn id="11" presetID="10" presetClass="entr" presetSubtype="0" fill="hold" nodeType="withEffect">
+                                  <p:stCondLst>
+                                    <p:cond delay="0"/>
+                                  </p:stCondLst>
+                                  <p:childTnLst>
+                                    <p:set>
+                                      <p:cBhvr>
+                                        <p:cTn id="12" dur="1" fill="hold">
+                                          <p:stCondLst>
+                                            <p:cond delay="0"/>
+                                          </p:stCondLst>
+                                        </p:cTn>
+                                        <p:tgtEl>
+                                          <p:spTgt spid="3">
+                                            <p:txEl>
+                                              <p:pRg st="6" end="6"/>
+                                            </p:txEl>
+                                          </p:spTgt>
+                                        </p:tgtEl>
+                                        <p:attrNameLst>
+                                          <p:attrName>style.visibility</p:attrName>
+                                        </p:attrNameLst>
+                                      </p:cBhvr>
+                                      <p:to>
+                                        <p:strVal val="visible"/>
+                                      </p:to>
+                                    </p:set>
+                                    <p:animEffect transition="in" filter="fade">
+                                      <p:cBhvr>
+                                        <p:cTn id="13" dur="2000"/>
+                                        <p:tgtEl>
+                                          <p:spTgt spid="3">
+                                            <p:txEl>
+                                              <p:pRg st="6" end="6"/>
+                                            </p:txEl>
+                                          </p:spTgt>
+                                        </p:tgtEl>
+                                      </p:cBhvr>
+                                    </p:animEffect>
+                                  </p:childTnLst>
+                                </p:cTn>
+                              </p:par>
+                            </p:childTnLst>
+                          </p:cTn>
+                        </p:par>
+                      </p:childTnLst>
+                    </p:cTn>
+                  </p:par>
+                </p:childTnLst>
+              </p:cTn>
+              <p:prevCondLst>
+                <p:cond evt="onPrev" delay="0">
+                  <p:tgtEl>
+                    <p:sldTgt/>
+                  </p:tgtEl>
+                </p:cond>
+              </p:prevCondLst>
+              <p:nextCondLst>
+                <p:cond evt="onNext" delay="0">
+                  <p:tgtEl>
+                    <p:sldTgt/>
+                  </p:tgtEl>
+                </p:cond>
+              </p:nextCondLst>
+            </p:seq>
+          </p:childTnLst>
+        </p:cTn>
       </p:par>
     </p:tnLst>
   </p:timing>
@@ -16784,10 +18144,7 @@
               </a:rPr>
               <a:t>0</a:t>
             </a:r>
-            <a:r>
-              <a:rPr lang="en-US" sz="2200" dirty="0" smtClean="0"/>
-              <a:t> </a:t>
-            </a:r>
+            <a:endParaRPr lang="en-US" sz="2200" dirty="0" smtClean="0"/>
           </a:p>
           <a:p>
             <a:r>
@@ -16850,7 +18207,177 @@
   <p:timing>
     <p:tnLst>
       <p:par>
-        <p:cTn id="1" dur="indefinite" restart="never" nodeType="tmRoot"/>
+        <p:cTn id="1" dur="indefinite" restart="never" nodeType="tmRoot">
+          <p:childTnLst>
+            <p:seq concurrent="1" nextAc="seek">
+              <p:cTn id="2" dur="indefinite" nodeType="mainSeq">
+                <p:childTnLst>
+                  <p:par>
+                    <p:cTn id="3" fill="hold">
+                      <p:stCondLst>
+                        <p:cond delay="indefinite"/>
+                      </p:stCondLst>
+                      <p:childTnLst>
+                        <p:par>
+                          <p:cTn id="4" fill="hold">
+                            <p:stCondLst>
+                              <p:cond delay="0"/>
+                            </p:stCondLst>
+                            <p:childTnLst>
+                              <p:par>
+                                <p:cTn id="5" presetID="10" presetClass="entr" presetSubtype="0" fill="hold" nodeType="clickEffect">
+                                  <p:stCondLst>
+                                    <p:cond delay="0"/>
+                                  </p:stCondLst>
+                                  <p:childTnLst>
+                                    <p:set>
+                                      <p:cBhvr>
+                                        <p:cTn id="6" dur="1" fill="hold">
+                                          <p:stCondLst>
+                                            <p:cond delay="0"/>
+                                          </p:stCondLst>
+                                        </p:cTn>
+                                        <p:tgtEl>
+                                          <p:spTgt spid="3">
+                                            <p:txEl>
+                                              <p:pRg st="4" end="4"/>
+                                            </p:txEl>
+                                          </p:spTgt>
+                                        </p:tgtEl>
+                                        <p:attrNameLst>
+                                          <p:attrName>style.visibility</p:attrName>
+                                        </p:attrNameLst>
+                                      </p:cBhvr>
+                                      <p:to>
+                                        <p:strVal val="visible"/>
+                                      </p:to>
+                                    </p:set>
+                                    <p:animEffect transition="in" filter="fade">
+                                      <p:cBhvr>
+                                        <p:cTn id="7" dur="2000"/>
+                                        <p:tgtEl>
+                                          <p:spTgt spid="3">
+                                            <p:txEl>
+                                              <p:pRg st="4" end="4"/>
+                                            </p:txEl>
+                                          </p:spTgt>
+                                        </p:tgtEl>
+                                      </p:cBhvr>
+                                    </p:animEffect>
+                                  </p:childTnLst>
+                                </p:cTn>
+                              </p:par>
+                              <p:par>
+                                <p:cTn id="8" presetID="10" presetClass="entr" presetSubtype="0" fill="hold" nodeType="withEffect">
+                                  <p:stCondLst>
+                                    <p:cond delay="0"/>
+                                  </p:stCondLst>
+                                  <p:childTnLst>
+                                    <p:set>
+                                      <p:cBhvr>
+                                        <p:cTn id="9" dur="1" fill="hold">
+                                          <p:stCondLst>
+                                            <p:cond delay="0"/>
+                                          </p:stCondLst>
+                                        </p:cTn>
+                                        <p:tgtEl>
+                                          <p:spTgt spid="3">
+                                            <p:txEl>
+                                              <p:pRg st="5" end="5"/>
+                                            </p:txEl>
+                                          </p:spTgt>
+                                        </p:tgtEl>
+                                        <p:attrNameLst>
+                                          <p:attrName>style.visibility</p:attrName>
+                                        </p:attrNameLst>
+                                      </p:cBhvr>
+                                      <p:to>
+                                        <p:strVal val="visible"/>
+                                      </p:to>
+                                    </p:set>
+                                    <p:animEffect transition="in" filter="fade">
+                                      <p:cBhvr>
+                                        <p:cTn id="10" dur="2000"/>
+                                        <p:tgtEl>
+                                          <p:spTgt spid="3">
+                                            <p:txEl>
+                                              <p:pRg st="5" end="5"/>
+                                            </p:txEl>
+                                          </p:spTgt>
+                                        </p:tgtEl>
+                                      </p:cBhvr>
+                                    </p:animEffect>
+                                  </p:childTnLst>
+                                </p:cTn>
+                              </p:par>
+                              <p:par>
+                                <p:cTn id="11" presetID="10" presetClass="entr" presetSubtype="0" fill="hold" nodeType="withEffect">
+                                  <p:stCondLst>
+                                    <p:cond delay="0"/>
+                                  </p:stCondLst>
+                                  <p:childTnLst>
+                                    <p:set>
+                                      <p:cBhvr>
+                                        <p:cTn id="12" dur="1" fill="hold">
+                                          <p:stCondLst>
+                                            <p:cond delay="0"/>
+                                          </p:stCondLst>
+                                        </p:cTn>
+                                        <p:tgtEl>
+                                          <p:spTgt spid="3">
+                                            <p:txEl>
+                                              <p:pRg st="6" end="6"/>
+                                            </p:txEl>
+                                          </p:spTgt>
+                                        </p:tgtEl>
+                                        <p:attrNameLst>
+                                          <p:attrName>style.visibility</p:attrName>
+                                        </p:attrNameLst>
+                                      </p:cBhvr>
+                                      <p:to>
+                                        <p:strVal val="visible"/>
+                                      </p:to>
+                                    </p:set>
+                                    <p:animEffect transition="in" filter="fade">
+                                      <p:cBhvr>
+                                        <p:cTn id="13" dur="2000"/>
+                                        <p:tgtEl>
+                                          <p:spTgt spid="3">
+                                            <p:txEl>
+                                              <p:pRg st="6" end="6"/>
+                                            </p:txEl>
+                                          </p:spTgt>
+                                        </p:tgtEl>
+                                      </p:cBhvr>
+                                    </p:animEffect>
+                                  </p:childTnLst>
+                                </p:cTn>
+                              </p:par>
+                            </p:childTnLst>
+                          </p:cTn>
+                        </p:par>
+                      </p:childTnLst>
+                    </p:cTn>
+                  </p:par>
+                </p:childTnLst>
+              </p:cTn>
+              <p:prevCondLst>
+                <p:cond evt="onPrev" delay="0">
+                  <p:tgtEl>
+                    <p:sldTgt/>
+                  </p:tgtEl>
+                </p:cond>
+              </p:prevCondLst>
+              <p:nextCondLst>
+                <p:cond evt="onNext" delay="0">
+                  <p:tgtEl>
+                    <p:sldTgt/>
+                  </p:tgtEl>
+                </p:cond>
+              </p:nextCondLst>
+            </p:seq>
+          </p:childTnLst>
+        </p:cTn>
       </p:par>
     </p:tnLst>
   </p:timing>
@@ -18385,12 +19912,24 @@
               <a:rPr lang="en-US" sz="2000" dirty="0" smtClean="0">
                 <a:latin typeface="Consolas" pitchFamily="49" charset="0"/>
               </a:rPr>
-              <a:t>(</a:t>
+              <a:t>&lt;</a:t>
             </a:r>
             <a:r>
               <a:rPr lang="en-US" sz="2000" dirty="0" err="1" smtClean="0">
                 <a:latin typeface="Consolas" pitchFamily="49" charset="0"/>
               </a:rPr>
+              <a:t>TEx</a:t>
+            </a:r>
+            <a:r>
+              <a:rPr lang="en-US" sz="2000" dirty="0" smtClean="0">
+                <a:latin typeface="Consolas" pitchFamily="49" charset="0"/>
+              </a:rPr>
+              <a:t>&gt;(</a:t>
+            </a:r>
+            <a:r>
+              <a:rPr lang="en-US" sz="2000" dirty="0" err="1" smtClean="0">
+                <a:latin typeface="Consolas" pitchFamily="49" charset="0"/>
+              </a:rPr>
               <a:t>IEnumerable</a:t>
             </a:r>
             <a:r>
@@ -18409,7 +19948,13 @@
               <a:rPr lang="en-US" sz="2000" dirty="0" smtClean="0">
                 <a:latin typeface="Consolas" pitchFamily="49" charset="0"/>
               </a:rPr>
-              <a:t>&lt;T&gt;&gt;)</a:t>
+              <a:t>&lt;T</a:t>
+            </a:r>
+            <a:r>
+              <a:rPr lang="en-US" sz="2000" dirty="0" smtClean="0">
+                <a:latin typeface="Consolas" pitchFamily="49" charset="0"/>
+              </a:rPr>
+              <a:t>&gt;&gt;)</a:t>
             </a:r>
           </a:p>
           <a:p>
@@ -18424,12 +19969,24 @@
               <a:rPr lang="en-US" sz="2000" dirty="0" smtClean="0">
                 <a:latin typeface="Consolas" pitchFamily="49" charset="0"/>
               </a:rPr>
-              <a:t>(</a:t>
+              <a:t>&lt;</a:t>
             </a:r>
             <a:r>
               <a:rPr lang="en-US" sz="2000" dirty="0" err="1" smtClean="0">
                 <a:latin typeface="Consolas" pitchFamily="49" charset="0"/>
               </a:rPr>
+              <a:t>TEx</a:t>
+            </a:r>
+            <a:r>
+              <a:rPr lang="en-US" sz="2000" dirty="0" smtClean="0">
+                <a:latin typeface="Consolas" pitchFamily="49" charset="0"/>
+              </a:rPr>
+              <a:t>&gt;(</a:t>
+            </a:r>
+            <a:r>
+              <a:rPr lang="en-US" sz="2000" dirty="0" err="1" smtClean="0">
+                <a:latin typeface="Consolas" pitchFamily="49" charset="0"/>
+              </a:rPr>
               <a:t>params</a:t>
             </a:r>
             <a:r>
@@ -18463,7 +20020,31 @@
               <a:rPr lang="en-US" sz="2000" dirty="0" smtClean="0">
                 <a:latin typeface="Consolas" pitchFamily="49" charset="0"/>
               </a:rPr>
-              <a:t>(second)</a:t>
+              <a:t>&lt;</a:t>
+            </a:r>
+            <a:r>
+              <a:rPr lang="en-US" sz="2000" dirty="0" err="1" smtClean="0">
+                <a:latin typeface="Consolas" pitchFamily="49" charset="0"/>
+              </a:rPr>
+              <a:t>TEx</a:t>
+            </a:r>
+            <a:r>
+              <a:rPr lang="en-US" sz="2000" dirty="0" smtClean="0">
+                <a:latin typeface="Consolas" pitchFamily="49" charset="0"/>
+              </a:rPr>
+              <a:t>&gt;(</a:t>
+            </a:r>
+            <a:r>
+              <a:rPr lang="en-US" sz="2000" dirty="0" smtClean="0">
+                <a:latin typeface="Consolas" pitchFamily="49" charset="0"/>
+              </a:rPr>
+              <a:t>second</a:t>
+            </a:r>
+            <a:r>
+              <a:rPr lang="en-US" sz="2000" dirty="0" smtClean="0">
+                <a:latin typeface="Consolas" pitchFamily="49" charset="0"/>
+              </a:rPr>
+              <a:t>)</a:t>
             </a:r>
           </a:p>
           <a:p>
@@ -18545,12 +20126,24 @@
               <a:rPr lang="en-US" sz="2000" dirty="0" smtClean="0">
                 <a:latin typeface="Consolas" pitchFamily="49" charset="0"/>
               </a:rPr>
-              <a:t>(</a:t>
+              <a:t>&lt;</a:t>
             </a:r>
             <a:r>
               <a:rPr lang="en-US" sz="2000" dirty="0" err="1" smtClean="0">
                 <a:latin typeface="Consolas" pitchFamily="49" charset="0"/>
               </a:rPr>
+              <a:t>TEx</a:t>
+            </a:r>
+            <a:r>
+              <a:rPr lang="en-US" sz="2000" dirty="0" smtClean="0">
+                <a:latin typeface="Consolas" pitchFamily="49" charset="0"/>
+              </a:rPr>
+              <a:t>&gt;(</a:t>
+            </a:r>
+            <a:r>
+              <a:rPr lang="en-US" sz="2000" dirty="0" err="1" smtClean="0">
+                <a:latin typeface="Consolas" pitchFamily="49" charset="0"/>
+              </a:rPr>
               <a:t>IEnumerable</a:t>
             </a:r>
             <a:r>
@@ -18569,7 +20162,13 @@
               <a:rPr lang="en-US" sz="2000" dirty="0" smtClean="0">
                 <a:latin typeface="Consolas" pitchFamily="49" charset="0"/>
               </a:rPr>
-              <a:t>&lt;T&gt;&gt;)</a:t>
+              <a:t>&lt;T</a:t>
+            </a:r>
+            <a:r>
+              <a:rPr lang="en-US" sz="2000" dirty="0" smtClean="0">
+                <a:latin typeface="Consolas" pitchFamily="49" charset="0"/>
+              </a:rPr>
+              <a:t>&gt;&gt;)</a:t>
             </a:r>
           </a:p>
           <a:p>
@@ -18584,12 +20183,24 @@
               <a:rPr lang="en-US" sz="2000" dirty="0" smtClean="0">
                 <a:latin typeface="Consolas" pitchFamily="49" charset="0"/>
               </a:rPr>
-              <a:t>(</a:t>
+              <a:t>&lt;</a:t>
             </a:r>
             <a:r>
               <a:rPr lang="en-US" sz="2000" dirty="0" err="1" smtClean="0">
                 <a:latin typeface="Consolas" pitchFamily="49" charset="0"/>
               </a:rPr>
+              <a:t>TEx</a:t>
+            </a:r>
+            <a:r>
+              <a:rPr lang="en-US" sz="2000" dirty="0" smtClean="0">
+                <a:latin typeface="Consolas" pitchFamily="49" charset="0"/>
+              </a:rPr>
+              <a:t>&gt;(</a:t>
+            </a:r>
+            <a:r>
+              <a:rPr lang="en-US" sz="2000" dirty="0" err="1" smtClean="0">
+                <a:latin typeface="Consolas" pitchFamily="49" charset="0"/>
+              </a:rPr>
               <a:t>params</a:t>
             </a:r>
             <a:r>
@@ -18623,7 +20234,25 @@
               <a:rPr lang="en-US" sz="2000" dirty="0" smtClean="0">
                 <a:latin typeface="Consolas" pitchFamily="49" charset="0"/>
               </a:rPr>
-              <a:t>(second)</a:t>
+              <a:t>&lt;</a:t>
+            </a:r>
+            <a:r>
+              <a:rPr lang="en-US" sz="2000" dirty="0" err="1" smtClean="0">
+                <a:latin typeface="Consolas" pitchFamily="49" charset="0"/>
+              </a:rPr>
+              <a:t>TEx</a:t>
+            </a:r>
+            <a:r>
+              <a:rPr lang="en-US" sz="2000" dirty="0" smtClean="0">
+                <a:latin typeface="Consolas" pitchFamily="49" charset="0"/>
+              </a:rPr>
+              <a:t>&gt;(</a:t>
+            </a:r>
+            <a:r>
+              <a:rPr lang="en-US" sz="2000" dirty="0" smtClean="0">
+                <a:latin typeface="Consolas" pitchFamily="49" charset="0"/>
+              </a:rPr>
+              <a:t>second)</a:t>
             </a:r>
           </a:p>
         </p:txBody>
@@ -20444,7 +22073,7 @@
               <a:rPr lang="en-US" sz="2000" dirty="0" smtClean="0">
                 <a:latin typeface="Consolas" pitchFamily="49" charset="0"/>
               </a:rPr>
-              <a:t>new[] {1,2,3}.</a:t>
+              <a:t>new[] {4,6,7}.</a:t>
             </a:r>
             <a:r>
               <a:rPr lang="en-US" sz="2000" dirty="0" err="1" smtClean="0">
@@ -20485,7 +22114,7 @@
                 <a:latin typeface="Consolas" pitchFamily="49" charset="0"/>
                 <a:sym typeface="Wingdings" pitchFamily="2" charset="2"/>
               </a:rPr>
-              <a:t>[2,6]</a:t>
+              <a:t>[24,42]</a:t>
             </a:r>
             <a:endParaRPr lang="en-US" sz="2000" dirty="0" smtClean="0">
               <a:latin typeface="Consolas" pitchFamily="49" charset="0"/>
@@ -23928,9 +25557,433 @@
   <p:timing>
     <p:tnLst>
       <p:par>
-        <p:cTn id="1" dur="indefinite" restart="never" nodeType="tmRoot"/>
+        <p:cTn id="1" dur="indefinite" restart="never" nodeType="tmRoot">
+          <p:childTnLst>
+            <p:seq concurrent="1" nextAc="seek">
+              <p:cTn id="2" dur="indefinite" nodeType="mainSeq">
+                <p:childTnLst>
+                  <p:par>
+                    <p:cTn id="3" fill="hold">
+                      <p:stCondLst>
+                        <p:cond delay="indefinite"/>
+                      </p:stCondLst>
+                      <p:childTnLst>
+                        <p:par>
+                          <p:cTn id="4" fill="hold">
+                            <p:stCondLst>
+                              <p:cond delay="0"/>
+                            </p:stCondLst>
+                            <p:childTnLst>
+                              <p:par>
+                                <p:cTn id="5" presetID="10" presetClass="entr" presetSubtype="0" fill="hold" grpId="0" nodeType="clickEffect">
+                                  <p:stCondLst>
+                                    <p:cond delay="0"/>
+                                  </p:stCondLst>
+                                  <p:childTnLst>
+                                    <p:set>
+                                      <p:cBhvr>
+                                        <p:cTn id="6" dur="1" fill="hold">
+                                          <p:stCondLst>
+                                            <p:cond delay="0"/>
+                                          </p:stCondLst>
+                                        </p:cTn>
+                                        <p:tgtEl>
+                                          <p:spTgt spid="3">
+                                            <p:txEl>
+                                              <p:pRg st="0" end="0"/>
+                                            </p:txEl>
+                                          </p:spTgt>
+                                        </p:tgtEl>
+                                        <p:attrNameLst>
+                                          <p:attrName>style.visibility</p:attrName>
+                                        </p:attrNameLst>
+                                      </p:cBhvr>
+                                      <p:to>
+                                        <p:strVal val="visible"/>
+                                      </p:to>
+                                    </p:set>
+                                    <p:animEffect transition="in" filter="fade">
+                                      <p:cBhvr>
+                                        <p:cTn id="7" dur="2000"/>
+                                        <p:tgtEl>
+                                          <p:spTgt spid="3">
+                                            <p:txEl>
+                                              <p:pRg st="0" end="0"/>
+                                            </p:txEl>
+                                          </p:spTgt>
+                                        </p:tgtEl>
+                                      </p:cBhvr>
+                                    </p:animEffect>
+                                  </p:childTnLst>
+                                </p:cTn>
+                              </p:par>
+                              <p:par>
+                                <p:cTn id="8" presetID="10" presetClass="entr" presetSubtype="0" fill="hold" grpId="0" nodeType="withEffect">
+                                  <p:stCondLst>
+                                    <p:cond delay="0"/>
+                                  </p:stCondLst>
+                                  <p:childTnLst>
+                                    <p:set>
+                                      <p:cBhvr>
+                                        <p:cTn id="9" dur="1" fill="hold">
+                                          <p:stCondLst>
+                                            <p:cond delay="0"/>
+                                          </p:stCondLst>
+                                        </p:cTn>
+                                        <p:tgtEl>
+                                          <p:spTgt spid="3">
+                                            <p:txEl>
+                                              <p:pRg st="1" end="1"/>
+                                            </p:txEl>
+                                          </p:spTgt>
+                                        </p:tgtEl>
+                                        <p:attrNameLst>
+                                          <p:attrName>style.visibility</p:attrName>
+                                        </p:attrNameLst>
+                                      </p:cBhvr>
+                                      <p:to>
+                                        <p:strVal val="visible"/>
+                                      </p:to>
+                                    </p:set>
+                                    <p:animEffect transition="in" filter="fade">
+                                      <p:cBhvr>
+                                        <p:cTn id="10" dur="2000"/>
+                                        <p:tgtEl>
+                                          <p:spTgt spid="3">
+                                            <p:txEl>
+                                              <p:pRg st="1" end="1"/>
+                                            </p:txEl>
+                                          </p:spTgt>
+                                        </p:tgtEl>
+                                      </p:cBhvr>
+                                    </p:animEffect>
+                                  </p:childTnLst>
+                                </p:cTn>
+                              </p:par>
+                              <p:par>
+                                <p:cTn id="11" presetID="10" presetClass="entr" presetSubtype="0" fill="hold" grpId="0" nodeType="withEffect">
+                                  <p:stCondLst>
+                                    <p:cond delay="0"/>
+                                  </p:stCondLst>
+                                  <p:childTnLst>
+                                    <p:set>
+                                      <p:cBhvr>
+                                        <p:cTn id="12" dur="1" fill="hold">
+                                          <p:stCondLst>
+                                            <p:cond delay="0"/>
+                                          </p:stCondLst>
+                                        </p:cTn>
+                                        <p:tgtEl>
+                                          <p:spTgt spid="3">
+                                            <p:txEl>
+                                              <p:pRg st="2" end="2"/>
+                                            </p:txEl>
+                                          </p:spTgt>
+                                        </p:tgtEl>
+                                        <p:attrNameLst>
+                                          <p:attrName>style.visibility</p:attrName>
+                                        </p:attrNameLst>
+                                      </p:cBhvr>
+                                      <p:to>
+                                        <p:strVal val="visible"/>
+                                      </p:to>
+                                    </p:set>
+                                    <p:animEffect transition="in" filter="fade">
+                                      <p:cBhvr>
+                                        <p:cTn id="13" dur="2000"/>
+                                        <p:tgtEl>
+                                          <p:spTgt spid="3">
+                                            <p:txEl>
+                                              <p:pRg st="2" end="2"/>
+                                            </p:txEl>
+                                          </p:spTgt>
+                                        </p:tgtEl>
+                                      </p:cBhvr>
+                                    </p:animEffect>
+                                  </p:childTnLst>
+                                </p:cTn>
+                              </p:par>
+                            </p:childTnLst>
+                          </p:cTn>
+                        </p:par>
+                      </p:childTnLst>
+                    </p:cTn>
+                  </p:par>
+                  <p:par>
+                    <p:cTn id="14" fill="hold">
+                      <p:stCondLst>
+                        <p:cond delay="indefinite"/>
+                      </p:stCondLst>
+                      <p:childTnLst>
+                        <p:par>
+                          <p:cTn id="15" fill="hold">
+                            <p:stCondLst>
+                              <p:cond delay="0"/>
+                            </p:stCondLst>
+                            <p:childTnLst>
+                              <p:par>
+                                <p:cTn id="16" presetID="10" presetClass="entr" presetSubtype="0" fill="hold" grpId="0" nodeType="clickEffect">
+                                  <p:stCondLst>
+                                    <p:cond delay="0"/>
+                                  </p:stCondLst>
+                                  <p:childTnLst>
+                                    <p:set>
+                                      <p:cBhvr>
+                                        <p:cTn id="17" dur="1" fill="hold">
+                                          <p:stCondLst>
+                                            <p:cond delay="0"/>
+                                          </p:stCondLst>
+                                        </p:cTn>
+                                        <p:tgtEl>
+                                          <p:spTgt spid="3">
+                                            <p:txEl>
+                                              <p:pRg st="3" end="3"/>
+                                            </p:txEl>
+                                          </p:spTgt>
+                                        </p:tgtEl>
+                                        <p:attrNameLst>
+                                          <p:attrName>style.visibility</p:attrName>
+                                        </p:attrNameLst>
+                                      </p:cBhvr>
+                                      <p:to>
+                                        <p:strVal val="visible"/>
+                                      </p:to>
+                                    </p:set>
+                                    <p:animEffect transition="in" filter="fade">
+                                      <p:cBhvr>
+                                        <p:cTn id="18" dur="2000"/>
+                                        <p:tgtEl>
+                                          <p:spTgt spid="3">
+                                            <p:txEl>
+                                              <p:pRg st="3" end="3"/>
+                                            </p:txEl>
+                                          </p:spTgt>
+                                        </p:tgtEl>
+                                      </p:cBhvr>
+                                    </p:animEffect>
+                                  </p:childTnLst>
+                                </p:cTn>
+                              </p:par>
+                              <p:par>
+                                <p:cTn id="19" presetID="10" presetClass="entr" presetSubtype="0" fill="hold" grpId="0" nodeType="withEffect">
+                                  <p:stCondLst>
+                                    <p:cond delay="0"/>
+                                  </p:stCondLst>
+                                  <p:childTnLst>
+                                    <p:set>
+                                      <p:cBhvr>
+                                        <p:cTn id="20" dur="1" fill="hold">
+                                          <p:stCondLst>
+                                            <p:cond delay="0"/>
+                                          </p:stCondLst>
+                                        </p:cTn>
+                                        <p:tgtEl>
+                                          <p:spTgt spid="3">
+                                            <p:txEl>
+                                              <p:pRg st="4" end="4"/>
+                                            </p:txEl>
+                                          </p:spTgt>
+                                        </p:tgtEl>
+                                        <p:attrNameLst>
+                                          <p:attrName>style.visibility</p:attrName>
+                                        </p:attrNameLst>
+                                      </p:cBhvr>
+                                      <p:to>
+                                        <p:strVal val="visible"/>
+                                      </p:to>
+                                    </p:set>
+                                    <p:animEffect transition="in" filter="fade">
+                                      <p:cBhvr>
+                                        <p:cTn id="21" dur="2000"/>
+                                        <p:tgtEl>
+                                          <p:spTgt spid="3">
+                                            <p:txEl>
+                                              <p:pRg st="4" end="4"/>
+                                            </p:txEl>
+                                          </p:spTgt>
+                                        </p:tgtEl>
+                                      </p:cBhvr>
+                                    </p:animEffect>
+                                  </p:childTnLst>
+                                </p:cTn>
+                              </p:par>
+                            </p:childTnLst>
+                          </p:cTn>
+                        </p:par>
+                      </p:childTnLst>
+                    </p:cTn>
+                  </p:par>
+                  <p:par>
+                    <p:cTn id="22" fill="hold">
+                      <p:stCondLst>
+                        <p:cond delay="indefinite"/>
+                      </p:stCondLst>
+                      <p:childTnLst>
+                        <p:par>
+                          <p:cTn id="23" fill="hold">
+                            <p:stCondLst>
+                              <p:cond delay="0"/>
+                            </p:stCondLst>
+                            <p:childTnLst>
+                              <p:par>
+                                <p:cTn id="24" presetID="10" presetClass="entr" presetSubtype="0" fill="hold" grpId="0" nodeType="clickEffect">
+                                  <p:stCondLst>
+                                    <p:cond delay="0"/>
+                                  </p:stCondLst>
+                                  <p:childTnLst>
+                                    <p:set>
+                                      <p:cBhvr>
+                                        <p:cTn id="25" dur="1" fill="hold">
+                                          <p:stCondLst>
+                                            <p:cond delay="0"/>
+                                          </p:stCondLst>
+                                        </p:cTn>
+                                        <p:tgtEl>
+                                          <p:spTgt spid="3">
+                                            <p:txEl>
+                                              <p:pRg st="5" end="5"/>
+                                            </p:txEl>
+                                          </p:spTgt>
+                                        </p:tgtEl>
+                                        <p:attrNameLst>
+                                          <p:attrName>style.visibility</p:attrName>
+                                        </p:attrNameLst>
+                                      </p:cBhvr>
+                                      <p:to>
+                                        <p:strVal val="visible"/>
+                                      </p:to>
+                                    </p:set>
+                                    <p:animEffect transition="in" filter="fade">
+                                      <p:cBhvr>
+                                        <p:cTn id="26" dur="2000"/>
+                                        <p:tgtEl>
+                                          <p:spTgt spid="3">
+                                            <p:txEl>
+                                              <p:pRg st="5" end="5"/>
+                                            </p:txEl>
+                                          </p:spTgt>
+                                        </p:tgtEl>
+                                      </p:cBhvr>
+                                    </p:animEffect>
+                                  </p:childTnLst>
+                                </p:cTn>
+                              </p:par>
+                              <p:par>
+                                <p:cTn id="27" presetID="10" presetClass="entr" presetSubtype="0" fill="hold" grpId="0" nodeType="withEffect">
+                                  <p:stCondLst>
+                                    <p:cond delay="0"/>
+                                  </p:stCondLst>
+                                  <p:childTnLst>
+                                    <p:set>
+                                      <p:cBhvr>
+                                        <p:cTn id="28" dur="1" fill="hold">
+                                          <p:stCondLst>
+                                            <p:cond delay="0"/>
+                                          </p:stCondLst>
+                                        </p:cTn>
+                                        <p:tgtEl>
+                                          <p:spTgt spid="3">
+                                            <p:txEl>
+                                              <p:pRg st="6" end="6"/>
+                                            </p:txEl>
+                                          </p:spTgt>
+                                        </p:tgtEl>
+                                        <p:attrNameLst>
+                                          <p:attrName>style.visibility</p:attrName>
+                                        </p:attrNameLst>
+                                      </p:cBhvr>
+                                      <p:to>
+                                        <p:strVal val="visible"/>
+                                      </p:to>
+                                    </p:set>
+                                    <p:animEffect transition="in" filter="fade">
+                                      <p:cBhvr>
+                                        <p:cTn id="29" dur="2000"/>
+                                        <p:tgtEl>
+                                          <p:spTgt spid="3">
+                                            <p:txEl>
+                                              <p:pRg st="6" end="6"/>
+                                            </p:txEl>
+                                          </p:spTgt>
+                                        </p:tgtEl>
+                                      </p:cBhvr>
+                                    </p:animEffect>
+                                  </p:childTnLst>
+                                </p:cTn>
+                              </p:par>
+                              <p:par>
+                                <p:cTn id="30" presetID="10" presetClass="entr" presetSubtype="0" fill="hold" grpId="0" nodeType="withEffect">
+                                  <p:stCondLst>
+                                    <p:cond delay="0"/>
+                                  </p:stCondLst>
+                                  <p:childTnLst>
+                                    <p:set>
+                                      <p:cBhvr>
+                                        <p:cTn id="31" dur="1" fill="hold">
+                                          <p:stCondLst>
+                                            <p:cond delay="0"/>
+                                          </p:stCondLst>
+                                        </p:cTn>
+                                        <p:tgtEl>
+                                          <p:spTgt spid="3">
+                                            <p:txEl>
+                                              <p:pRg st="7" end="7"/>
+                                            </p:txEl>
+                                          </p:spTgt>
+                                        </p:tgtEl>
+                                        <p:attrNameLst>
+                                          <p:attrName>style.visibility</p:attrName>
+                                        </p:attrNameLst>
+                                      </p:cBhvr>
+                                      <p:to>
+                                        <p:strVal val="visible"/>
+                                      </p:to>
+                                    </p:set>
+                                    <p:animEffect transition="in" filter="fade">
+                                      <p:cBhvr>
+                                        <p:cTn id="32" dur="2000"/>
+                                        <p:tgtEl>
+                                          <p:spTgt spid="3">
+                                            <p:txEl>
+                                              <p:pRg st="7" end="7"/>
+                                            </p:txEl>
+                                          </p:spTgt>
+                                        </p:tgtEl>
+                                      </p:cBhvr>
+                                    </p:animEffect>
+                                  </p:childTnLst>
+                                </p:cTn>
+                              </p:par>
+                            </p:childTnLst>
+                          </p:cTn>
+                        </p:par>
+                      </p:childTnLst>
+                    </p:cTn>
+                  </p:par>
+                </p:childTnLst>
+              </p:cTn>
+              <p:prevCondLst>
+                <p:cond evt="onPrev" delay="0">
+                  <p:tgtEl>
+                    <p:sldTgt/>
+                  </p:tgtEl>
+                </p:cond>
+              </p:prevCondLst>
+              <p:nextCondLst>
+                <p:cond evt="onNext" delay="0">
+                  <p:tgtEl>
+                    <p:sldTgt/>
+                  </p:tgtEl>
+                </p:cond>
+              </p:nextCondLst>
+            </p:seq>
+          </p:childTnLst>
+        </p:cTn>
       </p:par>
     </p:tnLst>
+    <p:bldLst>
+      <p:bldP spid="3" grpId="0" uiExpand="1" build="p"/>
+    </p:bldLst>
   </p:timing>
 </p:sld>
 </file>
@@ -24439,9 +26492,501 @@
   <p:timing>
     <p:tnLst>
       <p:par>
-        <p:cTn id="1" dur="indefinite" restart="never" nodeType="tmRoot"/>
+        <p:cTn id="1" dur="indefinite" restart="never" nodeType="tmRoot">
+          <p:childTnLst>
+            <p:seq concurrent="1" nextAc="seek">
+              <p:cTn id="2" dur="indefinite" nodeType="mainSeq">
+                <p:childTnLst>
+                  <p:par>
+                    <p:cTn id="3" fill="hold">
+                      <p:stCondLst>
+                        <p:cond delay="indefinite"/>
+                      </p:stCondLst>
+                      <p:childTnLst>
+                        <p:par>
+                          <p:cTn id="4" fill="hold">
+                            <p:stCondLst>
+                              <p:cond delay="0"/>
+                            </p:stCondLst>
+                            <p:childTnLst>
+                              <p:par>
+                                <p:cTn id="5" presetID="10" presetClass="entr" presetSubtype="0" fill="hold" grpId="0" nodeType="clickEffect">
+                                  <p:stCondLst>
+                                    <p:cond delay="0"/>
+                                  </p:stCondLst>
+                                  <p:childTnLst>
+                                    <p:set>
+                                      <p:cBhvr>
+                                        <p:cTn id="6" dur="1" fill="hold">
+                                          <p:stCondLst>
+                                            <p:cond delay="0"/>
+                                          </p:stCondLst>
+                                        </p:cTn>
+                                        <p:tgtEl>
+                                          <p:spTgt spid="3">
+                                            <p:txEl>
+                                              <p:pRg st="1" end="1"/>
+                                            </p:txEl>
+                                          </p:spTgt>
+                                        </p:tgtEl>
+                                        <p:attrNameLst>
+                                          <p:attrName>style.visibility</p:attrName>
+                                        </p:attrNameLst>
+                                      </p:cBhvr>
+                                      <p:to>
+                                        <p:strVal val="visible"/>
+                                      </p:to>
+                                    </p:set>
+                                    <p:animEffect transition="in" filter="fade">
+                                      <p:cBhvr>
+                                        <p:cTn id="7" dur="2000"/>
+                                        <p:tgtEl>
+                                          <p:spTgt spid="3">
+                                            <p:txEl>
+                                              <p:pRg st="1" end="1"/>
+                                            </p:txEl>
+                                          </p:spTgt>
+                                        </p:tgtEl>
+                                      </p:cBhvr>
+                                    </p:animEffect>
+                                  </p:childTnLst>
+                                </p:cTn>
+                              </p:par>
+                              <p:par>
+                                <p:cTn id="8" presetID="10" presetClass="entr" presetSubtype="0" fill="hold" grpId="0" nodeType="withEffect">
+                                  <p:stCondLst>
+                                    <p:cond delay="0"/>
+                                  </p:stCondLst>
+                                  <p:childTnLst>
+                                    <p:set>
+                                      <p:cBhvr>
+                                        <p:cTn id="9" dur="1" fill="hold">
+                                          <p:stCondLst>
+                                            <p:cond delay="0"/>
+                                          </p:stCondLst>
+                                        </p:cTn>
+                                        <p:tgtEl>
+                                          <p:spTgt spid="3">
+                                            <p:txEl>
+                                              <p:pRg st="2" end="2"/>
+                                            </p:txEl>
+                                          </p:spTgt>
+                                        </p:tgtEl>
+                                        <p:attrNameLst>
+                                          <p:attrName>style.visibility</p:attrName>
+                                        </p:attrNameLst>
+                                      </p:cBhvr>
+                                      <p:to>
+                                        <p:strVal val="visible"/>
+                                      </p:to>
+                                    </p:set>
+                                    <p:animEffect transition="in" filter="fade">
+                                      <p:cBhvr>
+                                        <p:cTn id="10" dur="2000"/>
+                                        <p:tgtEl>
+                                          <p:spTgt spid="3">
+                                            <p:txEl>
+                                              <p:pRg st="2" end="2"/>
+                                            </p:txEl>
+                                          </p:spTgt>
+                                        </p:tgtEl>
+                                      </p:cBhvr>
+                                    </p:animEffect>
+                                  </p:childTnLst>
+                                </p:cTn>
+                              </p:par>
+                              <p:par>
+                                <p:cTn id="11" presetID="10" presetClass="entr" presetSubtype="0" fill="hold" grpId="0" nodeType="withEffect">
+                                  <p:stCondLst>
+                                    <p:cond delay="0"/>
+                                  </p:stCondLst>
+                                  <p:childTnLst>
+                                    <p:set>
+                                      <p:cBhvr>
+                                        <p:cTn id="12" dur="1" fill="hold">
+                                          <p:stCondLst>
+                                            <p:cond delay="0"/>
+                                          </p:stCondLst>
+                                        </p:cTn>
+                                        <p:tgtEl>
+                                          <p:spTgt spid="3">
+                                            <p:txEl>
+                                              <p:pRg st="3" end="3"/>
+                                            </p:txEl>
+                                          </p:spTgt>
+                                        </p:tgtEl>
+                                        <p:attrNameLst>
+                                          <p:attrName>style.visibility</p:attrName>
+                                        </p:attrNameLst>
+                                      </p:cBhvr>
+                                      <p:to>
+                                        <p:strVal val="visible"/>
+                                      </p:to>
+                                    </p:set>
+                                    <p:animEffect transition="in" filter="fade">
+                                      <p:cBhvr>
+                                        <p:cTn id="13" dur="2000"/>
+                                        <p:tgtEl>
+                                          <p:spTgt spid="3">
+                                            <p:txEl>
+                                              <p:pRg st="3" end="3"/>
+                                            </p:txEl>
+                                          </p:spTgt>
+                                        </p:tgtEl>
+                                      </p:cBhvr>
+                                    </p:animEffect>
+                                  </p:childTnLst>
+                                </p:cTn>
+                              </p:par>
+                            </p:childTnLst>
+                          </p:cTn>
+                        </p:par>
+                      </p:childTnLst>
+                    </p:cTn>
+                  </p:par>
+                  <p:par>
+                    <p:cTn id="14" fill="hold">
+                      <p:stCondLst>
+                        <p:cond delay="indefinite"/>
+                      </p:stCondLst>
+                      <p:childTnLst>
+                        <p:par>
+                          <p:cTn id="15" fill="hold">
+                            <p:stCondLst>
+                              <p:cond delay="0"/>
+                            </p:stCondLst>
+                            <p:childTnLst>
+                              <p:par>
+                                <p:cTn id="16" presetID="10" presetClass="entr" presetSubtype="0" fill="hold" grpId="0" nodeType="clickEffect">
+                                  <p:stCondLst>
+                                    <p:cond delay="0"/>
+                                  </p:stCondLst>
+                                  <p:childTnLst>
+                                    <p:set>
+                                      <p:cBhvr>
+                                        <p:cTn id="17" dur="1" fill="hold">
+                                          <p:stCondLst>
+                                            <p:cond delay="0"/>
+                                          </p:stCondLst>
+                                        </p:cTn>
+                                        <p:tgtEl>
+                                          <p:spTgt spid="3">
+                                            <p:txEl>
+                                              <p:pRg st="4" end="4"/>
+                                            </p:txEl>
+                                          </p:spTgt>
+                                        </p:tgtEl>
+                                        <p:attrNameLst>
+                                          <p:attrName>style.visibility</p:attrName>
+                                        </p:attrNameLst>
+                                      </p:cBhvr>
+                                      <p:to>
+                                        <p:strVal val="visible"/>
+                                      </p:to>
+                                    </p:set>
+                                    <p:animEffect transition="in" filter="fade">
+                                      <p:cBhvr>
+                                        <p:cTn id="18" dur="2000"/>
+                                        <p:tgtEl>
+                                          <p:spTgt spid="3">
+                                            <p:txEl>
+                                              <p:pRg st="4" end="4"/>
+                                            </p:txEl>
+                                          </p:spTgt>
+                                        </p:tgtEl>
+                                      </p:cBhvr>
+                                    </p:animEffect>
+                                  </p:childTnLst>
+                                </p:cTn>
+                              </p:par>
+                              <p:par>
+                                <p:cTn id="19" presetID="10" presetClass="entr" presetSubtype="0" fill="hold" grpId="0" nodeType="withEffect">
+                                  <p:stCondLst>
+                                    <p:cond delay="0"/>
+                                  </p:stCondLst>
+                                  <p:childTnLst>
+                                    <p:set>
+                                      <p:cBhvr>
+                                        <p:cTn id="20" dur="1" fill="hold">
+                                          <p:stCondLst>
+                                            <p:cond delay="0"/>
+                                          </p:stCondLst>
+                                        </p:cTn>
+                                        <p:tgtEl>
+                                          <p:spTgt spid="3">
+                                            <p:txEl>
+                                              <p:pRg st="5" end="5"/>
+                                            </p:txEl>
+                                          </p:spTgt>
+                                        </p:tgtEl>
+                                        <p:attrNameLst>
+                                          <p:attrName>style.visibility</p:attrName>
+                                        </p:attrNameLst>
+                                      </p:cBhvr>
+                                      <p:to>
+                                        <p:strVal val="visible"/>
+                                      </p:to>
+                                    </p:set>
+                                    <p:animEffect transition="in" filter="fade">
+                                      <p:cBhvr>
+                                        <p:cTn id="21" dur="2000"/>
+                                        <p:tgtEl>
+                                          <p:spTgt spid="3">
+                                            <p:txEl>
+                                              <p:pRg st="5" end="5"/>
+                                            </p:txEl>
+                                          </p:spTgt>
+                                        </p:tgtEl>
+                                      </p:cBhvr>
+                                    </p:animEffect>
+                                  </p:childTnLst>
+                                </p:cTn>
+                              </p:par>
+                              <p:par>
+                                <p:cTn id="22" presetID="10" presetClass="entr" presetSubtype="0" fill="hold" grpId="0" nodeType="withEffect">
+                                  <p:stCondLst>
+                                    <p:cond delay="0"/>
+                                  </p:stCondLst>
+                                  <p:childTnLst>
+                                    <p:set>
+                                      <p:cBhvr>
+                                        <p:cTn id="23" dur="1" fill="hold">
+                                          <p:stCondLst>
+                                            <p:cond delay="0"/>
+                                          </p:stCondLst>
+                                        </p:cTn>
+                                        <p:tgtEl>
+                                          <p:spTgt spid="3">
+                                            <p:txEl>
+                                              <p:pRg st="6" end="6"/>
+                                            </p:txEl>
+                                          </p:spTgt>
+                                        </p:tgtEl>
+                                        <p:attrNameLst>
+                                          <p:attrName>style.visibility</p:attrName>
+                                        </p:attrNameLst>
+                                      </p:cBhvr>
+                                      <p:to>
+                                        <p:strVal val="visible"/>
+                                      </p:to>
+                                    </p:set>
+                                    <p:animEffect transition="in" filter="fade">
+                                      <p:cBhvr>
+                                        <p:cTn id="24" dur="2000"/>
+                                        <p:tgtEl>
+                                          <p:spTgt spid="3">
+                                            <p:txEl>
+                                              <p:pRg st="6" end="6"/>
+                                            </p:txEl>
+                                          </p:spTgt>
+                                        </p:tgtEl>
+                                      </p:cBhvr>
+                                    </p:animEffect>
+                                  </p:childTnLst>
+                                </p:cTn>
+                              </p:par>
+                              <p:par>
+                                <p:cTn id="25" presetID="10" presetClass="entr" presetSubtype="0" fill="hold" grpId="0" nodeType="withEffect">
+                                  <p:stCondLst>
+                                    <p:cond delay="0"/>
+                                  </p:stCondLst>
+                                  <p:childTnLst>
+                                    <p:set>
+                                      <p:cBhvr>
+                                        <p:cTn id="26" dur="1" fill="hold">
+                                          <p:stCondLst>
+                                            <p:cond delay="0"/>
+                                          </p:stCondLst>
+                                        </p:cTn>
+                                        <p:tgtEl>
+                                          <p:spTgt spid="3">
+                                            <p:txEl>
+                                              <p:pRg st="7" end="7"/>
+                                            </p:txEl>
+                                          </p:spTgt>
+                                        </p:tgtEl>
+                                        <p:attrNameLst>
+                                          <p:attrName>style.visibility</p:attrName>
+                                        </p:attrNameLst>
+                                      </p:cBhvr>
+                                      <p:to>
+                                        <p:strVal val="visible"/>
+                                      </p:to>
+                                    </p:set>
+                                    <p:animEffect transition="in" filter="fade">
+                                      <p:cBhvr>
+                                        <p:cTn id="27" dur="2000"/>
+                                        <p:tgtEl>
+                                          <p:spTgt spid="3">
+                                            <p:txEl>
+                                              <p:pRg st="7" end="7"/>
+                                            </p:txEl>
+                                          </p:spTgt>
+                                        </p:tgtEl>
+                                      </p:cBhvr>
+                                    </p:animEffect>
+                                  </p:childTnLst>
+                                </p:cTn>
+                              </p:par>
+                              <p:par>
+                                <p:cTn id="28" presetID="10" presetClass="entr" presetSubtype="0" fill="hold" grpId="0" nodeType="withEffect">
+                                  <p:stCondLst>
+                                    <p:cond delay="0"/>
+                                  </p:stCondLst>
+                                  <p:childTnLst>
+                                    <p:set>
+                                      <p:cBhvr>
+                                        <p:cTn id="29" dur="1" fill="hold">
+                                          <p:stCondLst>
+                                            <p:cond delay="0"/>
+                                          </p:stCondLst>
+                                        </p:cTn>
+                                        <p:tgtEl>
+                                          <p:spTgt spid="3">
+                                            <p:txEl>
+                                              <p:pRg st="8" end="8"/>
+                                            </p:txEl>
+                                          </p:spTgt>
+                                        </p:tgtEl>
+                                        <p:attrNameLst>
+                                          <p:attrName>style.visibility</p:attrName>
+                                        </p:attrNameLst>
+                                      </p:cBhvr>
+                                      <p:to>
+                                        <p:strVal val="visible"/>
+                                      </p:to>
+                                    </p:set>
+                                    <p:animEffect transition="in" filter="fade">
+                                      <p:cBhvr>
+                                        <p:cTn id="30" dur="2000"/>
+                                        <p:tgtEl>
+                                          <p:spTgt spid="3">
+                                            <p:txEl>
+                                              <p:pRg st="8" end="8"/>
+                                            </p:txEl>
+                                          </p:spTgt>
+                                        </p:tgtEl>
+                                      </p:cBhvr>
+                                    </p:animEffect>
+                                  </p:childTnLst>
+                                </p:cTn>
+                              </p:par>
+                              <p:par>
+                                <p:cTn id="31" presetID="10" presetClass="entr" presetSubtype="0" fill="hold" grpId="0" nodeType="withEffect">
+                                  <p:stCondLst>
+                                    <p:cond delay="0"/>
+                                  </p:stCondLst>
+                                  <p:childTnLst>
+                                    <p:set>
+                                      <p:cBhvr>
+                                        <p:cTn id="32" dur="1" fill="hold">
+                                          <p:stCondLst>
+                                            <p:cond delay="0"/>
+                                          </p:stCondLst>
+                                        </p:cTn>
+                                        <p:tgtEl>
+                                          <p:spTgt spid="3">
+                                            <p:txEl>
+                                              <p:pRg st="9" end="9"/>
+                                            </p:txEl>
+                                          </p:spTgt>
+                                        </p:tgtEl>
+                                        <p:attrNameLst>
+                                          <p:attrName>style.visibility</p:attrName>
+                                        </p:attrNameLst>
+                                      </p:cBhvr>
+                                      <p:to>
+                                        <p:strVal val="visible"/>
+                                      </p:to>
+                                    </p:set>
+                                    <p:animEffect transition="in" filter="fade">
+                                      <p:cBhvr>
+                                        <p:cTn id="33" dur="2000"/>
+                                        <p:tgtEl>
+                                          <p:spTgt spid="3">
+                                            <p:txEl>
+                                              <p:pRg st="9" end="9"/>
+                                            </p:txEl>
+                                          </p:spTgt>
+                                        </p:tgtEl>
+                                      </p:cBhvr>
+                                    </p:animEffect>
+                                  </p:childTnLst>
+                                </p:cTn>
+                              </p:par>
+                              <p:par>
+                                <p:cTn id="34" presetID="10" presetClass="entr" presetSubtype="0" fill="hold" grpId="0" nodeType="withEffect">
+                                  <p:stCondLst>
+                                    <p:cond delay="0"/>
+                                  </p:stCondLst>
+                                  <p:childTnLst>
+                                    <p:set>
+                                      <p:cBhvr>
+                                        <p:cTn id="35" dur="1" fill="hold">
+                                          <p:stCondLst>
+                                            <p:cond delay="0"/>
+                                          </p:stCondLst>
+                                        </p:cTn>
+                                        <p:tgtEl>
+                                          <p:spTgt spid="3">
+                                            <p:txEl>
+                                              <p:pRg st="10" end="10"/>
+                                            </p:txEl>
+                                          </p:spTgt>
+                                        </p:tgtEl>
+                                        <p:attrNameLst>
+                                          <p:attrName>style.visibility</p:attrName>
+                                        </p:attrNameLst>
+                                      </p:cBhvr>
+                                      <p:to>
+                                        <p:strVal val="visible"/>
+                                      </p:to>
+                                    </p:set>
+                                    <p:animEffect transition="in" filter="fade">
+                                      <p:cBhvr>
+                                        <p:cTn id="36" dur="2000"/>
+                                        <p:tgtEl>
+                                          <p:spTgt spid="3">
+                                            <p:txEl>
+                                              <p:pRg st="10" end="10"/>
+                                            </p:txEl>
+                                          </p:spTgt>
+                                        </p:tgtEl>
+                                      </p:cBhvr>
+                                    </p:animEffect>
+                                  </p:childTnLst>
+                                </p:cTn>
+                              </p:par>
+                            </p:childTnLst>
+                          </p:cTn>
+                        </p:par>
+                      </p:childTnLst>
+                    </p:cTn>
+                  </p:par>
+                </p:childTnLst>
+              </p:cTn>
+              <p:prevCondLst>
+                <p:cond evt="onPrev" delay="0">
+                  <p:tgtEl>
+                    <p:sldTgt/>
+                  </p:tgtEl>
+                </p:cond>
+              </p:prevCondLst>
+              <p:nextCondLst>
+                <p:cond evt="onNext" delay="0">
+                  <p:tgtEl>
+                    <p:sldTgt/>
+                  </p:tgtEl>
+                </p:cond>
+              </p:nextCondLst>
+            </p:seq>
+          </p:childTnLst>
+        </p:cTn>
       </p:par>
     </p:tnLst>
+    <p:bldLst>
+      <p:bldP spid="3" grpId="0" uiExpand="1" build="p"/>
+    </p:bldLst>
   </p:timing>
 </p:sld>
 </file>

</xml_diff>